<commit_message>
Update Cognitve Walkthrough PPT with established personas
</commit_message>
<xml_diff>
--- a/Cognitive_Presentations/Cognitive_Walkthrough_PPT_by_Risheet.pptx
+++ b/Cognitive_Presentations/Cognitive_Walkthrough_PPT_by_Risheet.pptx
@@ -121,6 +121,11 @@
       </a:defRPr>
     </a:lvl9pPr>
   </p:defaultTextStyle>
+  <p:extLst>
+    <p:ext uri="{EFAFB233-063F-42B5-8137-9DF3F51BA10A}">
+      <p15:sldGuideLst xmlns:p15="http://schemas.microsoft.com/office/powerpoint/2012/main"/>
+    </p:ext>
+  </p:extLst>
 </p:presentation>
 </file>
 
@@ -3598,7 +3603,7 @@
           <a:p>
             <a:fld id="{D4F8B5E8-0318-42B5-A066-397087C3A27C}" type="datetimeFigureOut">
               <a:rPr lang="en-IN" smtClean="0"/>
-              <a:t>08-05-2024</a:t>
+              <a:t>09-05-2024</a:t>
             </a:fld>
             <a:endParaRPr lang="en-IN"/>
           </a:p>
@@ -3768,7 +3773,7 @@
           <a:p>
             <a:fld id="{D4F8B5E8-0318-42B5-A066-397087C3A27C}" type="datetimeFigureOut">
               <a:rPr lang="en-IN" smtClean="0"/>
-              <a:t>08-05-2024</a:t>
+              <a:t>09-05-2024</a:t>
             </a:fld>
             <a:endParaRPr lang="en-IN"/>
           </a:p>
@@ -3948,7 +3953,7 @@
           <a:p>
             <a:fld id="{D4F8B5E8-0318-42B5-A066-397087C3A27C}" type="datetimeFigureOut">
               <a:rPr lang="en-IN" smtClean="0"/>
-              <a:t>08-05-2024</a:t>
+              <a:t>09-05-2024</a:t>
             </a:fld>
             <a:endParaRPr lang="en-IN"/>
           </a:p>
@@ -4118,7 +4123,7 @@
           <a:p>
             <a:fld id="{D4F8B5E8-0318-42B5-A066-397087C3A27C}" type="datetimeFigureOut">
               <a:rPr lang="en-IN" smtClean="0"/>
-              <a:t>08-05-2024</a:t>
+              <a:t>09-05-2024</a:t>
             </a:fld>
             <a:endParaRPr lang="en-IN"/>
           </a:p>
@@ -4364,7 +4369,7 @@
           <a:p>
             <a:fld id="{D4F8B5E8-0318-42B5-A066-397087C3A27C}" type="datetimeFigureOut">
               <a:rPr lang="en-IN" smtClean="0"/>
-              <a:t>08-05-2024</a:t>
+              <a:t>09-05-2024</a:t>
             </a:fld>
             <a:endParaRPr lang="en-IN"/>
           </a:p>
@@ -4596,7 +4601,7 @@
           <a:p>
             <a:fld id="{D4F8B5E8-0318-42B5-A066-397087C3A27C}" type="datetimeFigureOut">
               <a:rPr lang="en-IN" smtClean="0"/>
-              <a:t>08-05-2024</a:t>
+              <a:t>09-05-2024</a:t>
             </a:fld>
             <a:endParaRPr lang="en-IN"/>
           </a:p>
@@ -4963,7 +4968,7 @@
           <a:p>
             <a:fld id="{D4F8B5E8-0318-42B5-A066-397087C3A27C}" type="datetimeFigureOut">
               <a:rPr lang="en-IN" smtClean="0"/>
-              <a:t>08-05-2024</a:t>
+              <a:t>09-05-2024</a:t>
             </a:fld>
             <a:endParaRPr lang="en-IN"/>
           </a:p>
@@ -5081,7 +5086,7 @@
           <a:p>
             <a:fld id="{D4F8B5E8-0318-42B5-A066-397087C3A27C}" type="datetimeFigureOut">
               <a:rPr lang="en-IN" smtClean="0"/>
-              <a:t>08-05-2024</a:t>
+              <a:t>09-05-2024</a:t>
             </a:fld>
             <a:endParaRPr lang="en-IN"/>
           </a:p>
@@ -5176,7 +5181,7 @@
           <a:p>
             <a:fld id="{D4F8B5E8-0318-42B5-A066-397087C3A27C}" type="datetimeFigureOut">
               <a:rPr lang="en-IN" smtClean="0"/>
-              <a:t>08-05-2024</a:t>
+              <a:t>09-05-2024</a:t>
             </a:fld>
             <a:endParaRPr lang="en-IN"/>
           </a:p>
@@ -5453,7 +5458,7 @@
           <a:p>
             <a:fld id="{D4F8B5E8-0318-42B5-A066-397087C3A27C}" type="datetimeFigureOut">
               <a:rPr lang="en-IN" smtClean="0"/>
-              <a:t>08-05-2024</a:t>
+              <a:t>09-05-2024</a:t>
             </a:fld>
             <a:endParaRPr lang="en-IN"/>
           </a:p>
@@ -5710,7 +5715,7 @@
           <a:p>
             <a:fld id="{D4F8B5E8-0318-42B5-A066-397087C3A27C}" type="datetimeFigureOut">
               <a:rPr lang="en-IN" smtClean="0"/>
-              <a:t>08-05-2024</a:t>
+              <a:t>09-05-2024</a:t>
             </a:fld>
             <a:endParaRPr lang="en-IN"/>
           </a:p>
@@ -5923,7 +5928,7 @@
           <a:p>
             <a:fld id="{D4F8B5E8-0318-42B5-A066-397087C3A27C}" type="datetimeFigureOut">
               <a:rPr lang="en-IN" smtClean="0"/>
-              <a:t>08-05-2024</a:t>
+              <a:t>09-05-2024</a:t>
             </a:fld>
             <a:endParaRPr lang="en-IN"/>
           </a:p>
@@ -6343,7 +6348,7 @@
         <p:spPr>
           <a:xfrm>
             <a:off x="1" y="673100"/>
-            <a:ext cx="3257550" cy="4524315"/>
+            <a:ext cx="3257550" cy="2308324"/>
           </a:xfrm>
           <a:prstGeom prst="rect">
             <a:avLst/>
@@ -6390,7 +6395,7 @@
           <a:p>
             <a:r>
               <a:rPr lang="en-IN" sz="2400" dirty="0"/>
-              <a:t>Trevor Smith - a non-tech savvy roommate in their 30s. Takes their time looking at finer details but may not understand them at first glance.</a:t>
+              <a:t>           John Baker</a:t>
             </a:r>
           </a:p>
         </p:txBody>
@@ -6455,8 +6460,8 @@
           </a:prstGeom>
         </p:spPr>
       </p:pic>
-      <mc:AlternateContent xmlns:mc="http://schemas.openxmlformats.org/markup-compatibility/2006">
-        <mc:Choice xmlns:p14="http://schemas.microsoft.com/office/powerpoint/2010/main" Requires="p14">
+      <mc:AlternateContent xmlns:mc="http://schemas.openxmlformats.org/markup-compatibility/2006" xmlns:p14="http://schemas.microsoft.com/office/powerpoint/2010/main">
+        <mc:Choice Requires="p14">
           <p:contentPart p14:bwMode="auto" r:id="rId3">
             <p14:nvContentPartPr>
               <p14:cNvPr id="4" name="Ink 3">
@@ -6475,7 +6480,7 @@
             </p14:xfrm>
           </p:contentPart>
         </mc:Choice>
-        <mc:Fallback>
+        <mc:Fallback xmlns="">
           <p:pic>
             <p:nvPicPr>
               <p:cNvPr id="4" name="Ink 3">
@@ -6506,8 +6511,8 @@
           </p:pic>
         </mc:Fallback>
       </mc:AlternateContent>
-      <mc:AlternateContent xmlns:mc="http://schemas.openxmlformats.org/markup-compatibility/2006">
-        <mc:Choice xmlns:p14="http://schemas.microsoft.com/office/powerpoint/2010/main" Requires="p14">
+      <mc:AlternateContent xmlns:mc="http://schemas.openxmlformats.org/markup-compatibility/2006" xmlns:p14="http://schemas.microsoft.com/office/powerpoint/2010/main">
+        <mc:Choice Requires="p14">
           <p:contentPart p14:bwMode="auto" r:id="rId5">
             <p14:nvContentPartPr>
               <p14:cNvPr id="5" name="Ink 4">
@@ -6526,7 +6531,7 @@
             </p14:xfrm>
           </p:contentPart>
         </mc:Choice>
-        <mc:Fallback>
+        <mc:Fallback xmlns="">
           <p:pic>
             <p:nvPicPr>
               <p:cNvPr id="5" name="Ink 4">
@@ -6557,8 +6562,8 @@
           </p:pic>
         </mc:Fallback>
       </mc:AlternateContent>
-      <mc:AlternateContent xmlns:mc="http://schemas.openxmlformats.org/markup-compatibility/2006">
-        <mc:Choice xmlns:p14="http://schemas.microsoft.com/office/powerpoint/2010/main" Requires="p14">
+      <mc:AlternateContent xmlns:mc="http://schemas.openxmlformats.org/markup-compatibility/2006" xmlns:p14="http://schemas.microsoft.com/office/powerpoint/2010/main">
+        <mc:Choice Requires="p14">
           <p:contentPart p14:bwMode="auto" r:id="rId7">
             <p14:nvContentPartPr>
               <p14:cNvPr id="7" name="Ink 6">
@@ -6577,7 +6582,7 @@
             </p14:xfrm>
           </p:contentPart>
         </mc:Choice>
-        <mc:Fallback>
+        <mc:Fallback xmlns="">
           <p:pic>
             <p:nvPicPr>
               <p:cNvPr id="7" name="Ink 6">
@@ -6608,8 +6613,8 @@
           </p:pic>
         </mc:Fallback>
       </mc:AlternateContent>
-      <mc:AlternateContent xmlns:mc="http://schemas.openxmlformats.org/markup-compatibility/2006">
-        <mc:Choice xmlns:p14="http://schemas.microsoft.com/office/powerpoint/2010/main" Requires="p14">
+      <mc:AlternateContent xmlns:mc="http://schemas.openxmlformats.org/markup-compatibility/2006" xmlns:p14="http://schemas.microsoft.com/office/powerpoint/2010/main">
+        <mc:Choice Requires="p14">
           <p:contentPart p14:bwMode="auto" r:id="rId9">
             <p14:nvContentPartPr>
               <p14:cNvPr id="9" name="Ink 8">
@@ -6628,7 +6633,7 @@
             </p14:xfrm>
           </p:contentPart>
         </mc:Choice>
-        <mc:Fallback>
+        <mc:Fallback xmlns="">
           <p:pic>
             <p:nvPicPr>
               <p:cNvPr id="9" name="Ink 8">
@@ -6659,8 +6664,8 @@
           </p:pic>
         </mc:Fallback>
       </mc:AlternateContent>
-      <mc:AlternateContent xmlns:mc="http://schemas.openxmlformats.org/markup-compatibility/2006">
-        <mc:Choice xmlns:p14="http://schemas.microsoft.com/office/powerpoint/2010/main" Requires="p14">
+      <mc:AlternateContent xmlns:mc="http://schemas.openxmlformats.org/markup-compatibility/2006" xmlns:p14="http://schemas.microsoft.com/office/powerpoint/2010/main">
+        <mc:Choice Requires="p14">
           <p:contentPart p14:bwMode="auto" r:id="rId11">
             <p14:nvContentPartPr>
               <p14:cNvPr id="10" name="Ink 9">
@@ -6679,7 +6684,7 @@
             </p14:xfrm>
           </p:contentPart>
         </mc:Choice>
-        <mc:Fallback>
+        <mc:Fallback xmlns="">
           <p:pic>
             <p:nvPicPr>
               <p:cNvPr id="10" name="Ink 9">
@@ -6710,8 +6715,8 @@
           </p:pic>
         </mc:Fallback>
       </mc:AlternateContent>
-      <mc:AlternateContent xmlns:mc="http://schemas.openxmlformats.org/markup-compatibility/2006">
-        <mc:Choice xmlns:p14="http://schemas.microsoft.com/office/powerpoint/2010/main" Requires="p14">
+      <mc:AlternateContent xmlns:mc="http://schemas.openxmlformats.org/markup-compatibility/2006" xmlns:p14="http://schemas.microsoft.com/office/powerpoint/2010/main">
+        <mc:Choice Requires="p14">
           <p:contentPart p14:bwMode="auto" r:id="rId13">
             <p14:nvContentPartPr>
               <p14:cNvPr id="11" name="Ink 10">
@@ -6730,7 +6735,7 @@
             </p14:xfrm>
           </p:contentPart>
         </mc:Choice>
-        <mc:Fallback>
+        <mc:Fallback xmlns="">
           <p:pic>
             <p:nvPicPr>
               <p:cNvPr id="11" name="Ink 10">
@@ -6761,8 +6766,8 @@
           </p:pic>
         </mc:Fallback>
       </mc:AlternateContent>
-      <mc:AlternateContent xmlns:mc="http://schemas.openxmlformats.org/markup-compatibility/2006">
-        <mc:Choice xmlns:p14="http://schemas.microsoft.com/office/powerpoint/2010/main" Requires="p14">
+      <mc:AlternateContent xmlns:mc="http://schemas.openxmlformats.org/markup-compatibility/2006" xmlns:p14="http://schemas.microsoft.com/office/powerpoint/2010/main">
+        <mc:Choice Requires="p14">
           <p:contentPart p14:bwMode="auto" r:id="rId15">
             <p14:nvContentPartPr>
               <p14:cNvPr id="12" name="Ink 11">
@@ -6781,7 +6786,7 @@
             </p14:xfrm>
           </p:contentPart>
         </mc:Choice>
-        <mc:Fallback>
+        <mc:Fallback xmlns="">
           <p:pic>
             <p:nvPicPr>
               <p:cNvPr id="12" name="Ink 11">
@@ -6812,8 +6817,8 @@
           </p:pic>
         </mc:Fallback>
       </mc:AlternateContent>
-      <mc:AlternateContent xmlns:mc="http://schemas.openxmlformats.org/markup-compatibility/2006">
-        <mc:Choice xmlns:p14="http://schemas.microsoft.com/office/powerpoint/2010/main" Requires="p14">
+      <mc:AlternateContent xmlns:mc="http://schemas.openxmlformats.org/markup-compatibility/2006" xmlns:p14="http://schemas.microsoft.com/office/powerpoint/2010/main">
+        <mc:Choice Requires="p14">
           <p:contentPart p14:bwMode="auto" r:id="rId17">
             <p14:nvContentPartPr>
               <p14:cNvPr id="13" name="Ink 12">
@@ -6832,7 +6837,7 @@
             </p14:xfrm>
           </p:contentPart>
         </mc:Choice>
-        <mc:Fallback>
+        <mc:Fallback xmlns="">
           <p:pic>
             <p:nvPicPr>
               <p:cNvPr id="13" name="Ink 12">
@@ -6863,8 +6868,8 @@
           </p:pic>
         </mc:Fallback>
       </mc:AlternateContent>
-      <mc:AlternateContent xmlns:mc="http://schemas.openxmlformats.org/markup-compatibility/2006">
-        <mc:Choice xmlns:p14="http://schemas.microsoft.com/office/powerpoint/2010/main" Requires="p14">
+      <mc:AlternateContent xmlns:mc="http://schemas.openxmlformats.org/markup-compatibility/2006" xmlns:p14="http://schemas.microsoft.com/office/powerpoint/2010/main">
+        <mc:Choice Requires="p14">
           <p:contentPart p14:bwMode="auto" r:id="rId19">
             <p14:nvContentPartPr>
               <p14:cNvPr id="14" name="Ink 13">
@@ -6883,7 +6888,7 @@
             </p14:xfrm>
           </p:contentPart>
         </mc:Choice>
-        <mc:Fallback>
+        <mc:Fallback xmlns="">
           <p:pic>
             <p:nvPicPr>
               <p:cNvPr id="14" name="Ink 13">
@@ -6974,8 +6979,8 @@
           </a:prstGeom>
         </p:spPr>
       </p:pic>
-      <mc:AlternateContent xmlns:mc="http://schemas.openxmlformats.org/markup-compatibility/2006">
-        <mc:Choice xmlns:p14="http://schemas.microsoft.com/office/powerpoint/2010/main" Requires="p14">
+      <mc:AlternateContent xmlns:mc="http://schemas.openxmlformats.org/markup-compatibility/2006" xmlns:p14="http://schemas.microsoft.com/office/powerpoint/2010/main">
+        <mc:Choice Requires="p14">
           <p:contentPart p14:bwMode="auto" r:id="rId3">
             <p14:nvContentPartPr>
               <p14:cNvPr id="5" name="Ink 4">
@@ -6994,7 +6999,7 @@
             </p14:xfrm>
           </p:contentPart>
         </mc:Choice>
-        <mc:Fallback>
+        <mc:Fallback xmlns="">
           <p:pic>
             <p:nvPicPr>
               <p:cNvPr id="5" name="Ink 4">
@@ -7025,8 +7030,8 @@
           </p:pic>
         </mc:Fallback>
       </mc:AlternateContent>
-      <mc:AlternateContent xmlns:mc="http://schemas.openxmlformats.org/markup-compatibility/2006">
-        <mc:Choice xmlns:p14="http://schemas.microsoft.com/office/powerpoint/2010/main" Requires="p14">
+      <mc:AlternateContent xmlns:mc="http://schemas.openxmlformats.org/markup-compatibility/2006" xmlns:p14="http://schemas.microsoft.com/office/powerpoint/2010/main">
+        <mc:Choice Requires="p14">
           <p:contentPart p14:bwMode="auto" r:id="rId5">
             <p14:nvContentPartPr>
               <p14:cNvPr id="6" name="Ink 5">
@@ -7045,7 +7050,7 @@
             </p14:xfrm>
           </p:contentPart>
         </mc:Choice>
-        <mc:Fallback>
+        <mc:Fallback xmlns="">
           <p:pic>
             <p:nvPicPr>
               <p:cNvPr id="6" name="Ink 5">
@@ -7076,8 +7081,8 @@
           </p:pic>
         </mc:Fallback>
       </mc:AlternateContent>
-      <mc:AlternateContent xmlns:mc="http://schemas.openxmlformats.org/markup-compatibility/2006">
-        <mc:Choice xmlns:p14="http://schemas.microsoft.com/office/powerpoint/2010/main" Requires="p14">
+      <mc:AlternateContent xmlns:mc="http://schemas.openxmlformats.org/markup-compatibility/2006" xmlns:p14="http://schemas.microsoft.com/office/powerpoint/2010/main">
+        <mc:Choice Requires="p14">
           <p:contentPart p14:bwMode="auto" r:id="rId7">
             <p14:nvContentPartPr>
               <p14:cNvPr id="7" name="Ink 6">
@@ -7096,7 +7101,7 @@
             </p14:xfrm>
           </p:contentPart>
         </mc:Choice>
-        <mc:Fallback>
+        <mc:Fallback xmlns="">
           <p:pic>
             <p:nvPicPr>
               <p:cNvPr id="7" name="Ink 6">
@@ -7127,8 +7132,8 @@
           </p:pic>
         </mc:Fallback>
       </mc:AlternateContent>
-      <mc:AlternateContent xmlns:mc="http://schemas.openxmlformats.org/markup-compatibility/2006">
-        <mc:Choice xmlns:p14="http://schemas.microsoft.com/office/powerpoint/2010/main" Requires="p14">
+      <mc:AlternateContent xmlns:mc="http://schemas.openxmlformats.org/markup-compatibility/2006" xmlns:p14="http://schemas.microsoft.com/office/powerpoint/2010/main">
+        <mc:Choice Requires="p14">
           <p:contentPart p14:bwMode="auto" r:id="rId9">
             <p14:nvContentPartPr>
               <p14:cNvPr id="8" name="Ink 7">
@@ -7147,7 +7152,7 @@
             </p14:xfrm>
           </p:contentPart>
         </mc:Choice>
-        <mc:Fallback>
+        <mc:Fallback xmlns="">
           <p:pic>
             <p:nvPicPr>
               <p:cNvPr id="8" name="Ink 7">
@@ -7178,8 +7183,8 @@
           </p:pic>
         </mc:Fallback>
       </mc:AlternateContent>
-      <mc:AlternateContent xmlns:mc="http://schemas.openxmlformats.org/markup-compatibility/2006">
-        <mc:Choice xmlns:p14="http://schemas.microsoft.com/office/powerpoint/2010/main" Requires="p14">
+      <mc:AlternateContent xmlns:mc="http://schemas.openxmlformats.org/markup-compatibility/2006" xmlns:p14="http://schemas.microsoft.com/office/powerpoint/2010/main">
+        <mc:Choice Requires="p14">
           <p:contentPart p14:bwMode="auto" r:id="rId11">
             <p14:nvContentPartPr>
               <p14:cNvPr id="9" name="Ink 8">
@@ -7198,7 +7203,7 @@
             </p14:xfrm>
           </p:contentPart>
         </mc:Choice>
-        <mc:Fallback>
+        <mc:Fallback xmlns="">
           <p:pic>
             <p:nvPicPr>
               <p:cNvPr id="9" name="Ink 8">
@@ -7229,8 +7234,8 @@
           </p:pic>
         </mc:Fallback>
       </mc:AlternateContent>
-      <mc:AlternateContent xmlns:mc="http://schemas.openxmlformats.org/markup-compatibility/2006">
-        <mc:Choice xmlns:p14="http://schemas.microsoft.com/office/powerpoint/2010/main" Requires="p14">
+      <mc:AlternateContent xmlns:mc="http://schemas.openxmlformats.org/markup-compatibility/2006" xmlns:p14="http://schemas.microsoft.com/office/powerpoint/2010/main">
+        <mc:Choice Requires="p14">
           <p:contentPart p14:bwMode="auto" r:id="rId13">
             <p14:nvContentPartPr>
               <p14:cNvPr id="10" name="Ink 9">
@@ -7249,7 +7254,7 @@
             </p14:xfrm>
           </p:contentPart>
         </mc:Choice>
-        <mc:Fallback>
+        <mc:Fallback xmlns="">
           <p:pic>
             <p:nvPicPr>
               <p:cNvPr id="10" name="Ink 9">
@@ -7280,8 +7285,8 @@
           </p:pic>
         </mc:Fallback>
       </mc:AlternateContent>
-      <mc:AlternateContent xmlns:mc="http://schemas.openxmlformats.org/markup-compatibility/2006">
-        <mc:Choice xmlns:p14="http://schemas.microsoft.com/office/powerpoint/2010/main" Requires="p14">
+      <mc:AlternateContent xmlns:mc="http://schemas.openxmlformats.org/markup-compatibility/2006" xmlns:p14="http://schemas.microsoft.com/office/powerpoint/2010/main">
+        <mc:Choice Requires="p14">
           <p:contentPart p14:bwMode="auto" r:id="rId15">
             <p14:nvContentPartPr>
               <p14:cNvPr id="11" name="Ink 10">
@@ -7300,7 +7305,7 @@
             </p14:xfrm>
           </p:contentPart>
         </mc:Choice>
-        <mc:Fallback>
+        <mc:Fallback xmlns="">
           <p:pic>
             <p:nvPicPr>
               <p:cNvPr id="11" name="Ink 10">
@@ -7331,8 +7336,8 @@
           </p:pic>
         </mc:Fallback>
       </mc:AlternateContent>
-      <mc:AlternateContent xmlns:mc="http://schemas.openxmlformats.org/markup-compatibility/2006">
-        <mc:Choice xmlns:p14="http://schemas.microsoft.com/office/powerpoint/2010/main" Requires="p14">
+      <mc:AlternateContent xmlns:mc="http://schemas.openxmlformats.org/markup-compatibility/2006" xmlns:p14="http://schemas.microsoft.com/office/powerpoint/2010/main">
+        <mc:Choice Requires="p14">
           <p:contentPart p14:bwMode="auto" r:id="rId17">
             <p14:nvContentPartPr>
               <p14:cNvPr id="12" name="Ink 11">
@@ -7351,7 +7356,7 @@
             </p14:xfrm>
           </p:contentPart>
         </mc:Choice>
-        <mc:Fallback>
+        <mc:Fallback xmlns="">
           <p:pic>
             <p:nvPicPr>
               <p:cNvPr id="12" name="Ink 11">
@@ -7442,8 +7447,8 @@
           </a:prstGeom>
         </p:spPr>
       </p:pic>
-      <mc:AlternateContent xmlns:mc="http://schemas.openxmlformats.org/markup-compatibility/2006">
-        <mc:Choice xmlns:p14="http://schemas.microsoft.com/office/powerpoint/2010/main" Requires="p14">
+      <mc:AlternateContent xmlns:mc="http://schemas.openxmlformats.org/markup-compatibility/2006" xmlns:p14="http://schemas.microsoft.com/office/powerpoint/2010/main">
+        <mc:Choice Requires="p14">
           <p:contentPart p14:bwMode="auto" r:id="rId3">
             <p14:nvContentPartPr>
               <p14:cNvPr id="7" name="Ink 6">
@@ -7462,7 +7467,7 @@
             </p14:xfrm>
           </p:contentPart>
         </mc:Choice>
-        <mc:Fallback>
+        <mc:Fallback xmlns="">
           <p:pic>
             <p:nvPicPr>
               <p:cNvPr id="7" name="Ink 6">
@@ -7493,8 +7498,8 @@
           </p:pic>
         </mc:Fallback>
       </mc:AlternateContent>
-      <mc:AlternateContent xmlns:mc="http://schemas.openxmlformats.org/markup-compatibility/2006">
-        <mc:Choice xmlns:p14="http://schemas.microsoft.com/office/powerpoint/2010/main" Requires="p14">
+      <mc:AlternateContent xmlns:mc="http://schemas.openxmlformats.org/markup-compatibility/2006" xmlns:p14="http://schemas.microsoft.com/office/powerpoint/2010/main">
+        <mc:Choice Requires="p14">
           <p:contentPart p14:bwMode="auto" r:id="rId5">
             <p14:nvContentPartPr>
               <p14:cNvPr id="9" name="Ink 8">
@@ -7513,7 +7518,7 @@
             </p14:xfrm>
           </p:contentPart>
         </mc:Choice>
-        <mc:Fallback>
+        <mc:Fallback xmlns="">
           <p:pic>
             <p:nvPicPr>
               <p:cNvPr id="9" name="Ink 8">
@@ -7564,8 +7569,8 @@
             <a:chExt cx="883080" cy="420120"/>
           </a:xfrm>
         </p:grpSpPr>
-        <mc:AlternateContent xmlns:mc="http://schemas.openxmlformats.org/markup-compatibility/2006">
-          <mc:Choice xmlns:p14="http://schemas.microsoft.com/office/powerpoint/2010/main" Requires="p14">
+        <mc:AlternateContent xmlns:mc="http://schemas.openxmlformats.org/markup-compatibility/2006" xmlns:p14="http://schemas.microsoft.com/office/powerpoint/2010/main">
+          <mc:Choice Requires="p14">
             <p:contentPart p14:bwMode="auto" r:id="rId7">
               <p14:nvContentPartPr>
                 <p14:cNvPr id="4" name="Ink 3">
@@ -7584,7 +7589,7 @@
               </p14:xfrm>
             </p:contentPart>
           </mc:Choice>
-          <mc:Fallback>
+          <mc:Fallback xmlns="">
             <p:pic>
               <p:nvPicPr>
                 <p:cNvPr id="4" name="Ink 3">
@@ -7615,8 +7620,8 @@
             </p:pic>
           </mc:Fallback>
         </mc:AlternateContent>
-        <mc:AlternateContent xmlns:mc="http://schemas.openxmlformats.org/markup-compatibility/2006">
-          <mc:Choice xmlns:p14="http://schemas.microsoft.com/office/powerpoint/2010/main" Requires="p14">
+        <mc:AlternateContent xmlns:mc="http://schemas.openxmlformats.org/markup-compatibility/2006" xmlns:p14="http://schemas.microsoft.com/office/powerpoint/2010/main">
+          <mc:Choice Requires="p14">
             <p:contentPart p14:bwMode="auto" r:id="rId9">
               <p14:nvContentPartPr>
                 <p14:cNvPr id="5" name="Ink 4">
@@ -7635,7 +7640,7 @@
               </p14:xfrm>
             </p:contentPart>
           </mc:Choice>
-          <mc:Fallback>
+          <mc:Fallback xmlns="">
             <p:pic>
               <p:nvPicPr>
                 <p:cNvPr id="5" name="Ink 4">
@@ -7666,8 +7671,8 @@
             </p:pic>
           </mc:Fallback>
         </mc:AlternateContent>
-        <mc:AlternateContent xmlns:mc="http://schemas.openxmlformats.org/markup-compatibility/2006">
-          <mc:Choice xmlns:p14="http://schemas.microsoft.com/office/powerpoint/2010/main" Requires="p14">
+        <mc:AlternateContent xmlns:mc="http://schemas.openxmlformats.org/markup-compatibility/2006" xmlns:p14="http://schemas.microsoft.com/office/powerpoint/2010/main">
+          <mc:Choice Requires="p14">
             <p:contentPart p14:bwMode="auto" r:id="rId11">
               <p14:nvContentPartPr>
                 <p14:cNvPr id="11" name="Ink 10">
@@ -7686,7 +7691,7 @@
               </p14:xfrm>
             </p:contentPart>
           </mc:Choice>
-          <mc:Fallback>
+          <mc:Fallback xmlns="">
             <p:pic>
               <p:nvPicPr>
                 <p:cNvPr id="11" name="Ink 10">
@@ -7717,8 +7722,8 @@
             </p:pic>
           </mc:Fallback>
         </mc:AlternateContent>
-        <mc:AlternateContent xmlns:mc="http://schemas.openxmlformats.org/markup-compatibility/2006">
-          <mc:Choice xmlns:p14="http://schemas.microsoft.com/office/powerpoint/2010/main" Requires="p14">
+        <mc:AlternateContent xmlns:mc="http://schemas.openxmlformats.org/markup-compatibility/2006" xmlns:p14="http://schemas.microsoft.com/office/powerpoint/2010/main">
+          <mc:Choice Requires="p14">
             <p:contentPart p14:bwMode="auto" r:id="rId13">
               <p14:nvContentPartPr>
                 <p14:cNvPr id="13" name="Ink 12">
@@ -7737,7 +7742,7 @@
               </p14:xfrm>
             </p:contentPart>
           </mc:Choice>
-          <mc:Fallback>
+          <mc:Fallback xmlns="">
             <p:pic>
               <p:nvPicPr>
                 <p:cNvPr id="13" name="Ink 12">
@@ -7874,7 +7879,7 @@
         <p:spPr>
           <a:xfrm>
             <a:off x="1" y="673100"/>
-            <a:ext cx="3257550" cy="4893647"/>
+            <a:ext cx="3257550" cy="3046988"/>
           </a:xfrm>
           <a:prstGeom prst="rect">
             <a:avLst/>
@@ -7920,9 +7925,10 @@
           </a:p>
           <a:p>
             <a:r>
-              <a:rPr lang="en-IN" sz="2400" dirty="0"/>
-              <a:t>Toby Baker, a roommate in their 20s with long-sighted vision. They cannot see tiny text on the phone up close.</a:t>
+              <a:rPr lang="en-IN" sz="2400"/>
+              <a:t>          Abby Jones</a:t>
             </a:r>
+            <a:endParaRPr lang="en-IN" sz="2400" dirty="0"/>
           </a:p>
         </p:txBody>
       </p:sp>
@@ -7986,8 +7992,8 @@
           </a:prstGeom>
         </p:spPr>
       </p:pic>
-      <mc:AlternateContent xmlns:mc="http://schemas.openxmlformats.org/markup-compatibility/2006">
-        <mc:Choice xmlns:p14="http://schemas.microsoft.com/office/powerpoint/2010/main" Requires="p14">
+      <mc:AlternateContent xmlns:mc="http://schemas.openxmlformats.org/markup-compatibility/2006" xmlns:p14="http://schemas.microsoft.com/office/powerpoint/2010/main">
+        <mc:Choice Requires="p14">
           <p:contentPart p14:bwMode="auto" r:id="rId3">
             <p14:nvContentPartPr>
               <p14:cNvPr id="4" name="Ink 3">
@@ -8006,7 +8012,7 @@
             </p14:xfrm>
           </p:contentPart>
         </mc:Choice>
-        <mc:Fallback>
+        <mc:Fallback xmlns="">
           <p:pic>
             <p:nvPicPr>
               <p:cNvPr id="4" name="Ink 3">
@@ -8037,8 +8043,8 @@
           </p:pic>
         </mc:Fallback>
       </mc:AlternateContent>
-      <mc:AlternateContent xmlns:mc="http://schemas.openxmlformats.org/markup-compatibility/2006">
-        <mc:Choice xmlns:p14="http://schemas.microsoft.com/office/powerpoint/2010/main" Requires="p14">
+      <mc:AlternateContent xmlns:mc="http://schemas.openxmlformats.org/markup-compatibility/2006" xmlns:p14="http://schemas.microsoft.com/office/powerpoint/2010/main">
+        <mc:Choice Requires="p14">
           <p:contentPart p14:bwMode="auto" r:id="rId5">
             <p14:nvContentPartPr>
               <p14:cNvPr id="5" name="Ink 4">
@@ -8057,7 +8063,7 @@
             </p14:xfrm>
           </p:contentPart>
         </mc:Choice>
-        <mc:Fallback>
+        <mc:Fallback xmlns="">
           <p:pic>
             <p:nvPicPr>
               <p:cNvPr id="5" name="Ink 4">
@@ -8088,8 +8094,8 @@
           </p:pic>
         </mc:Fallback>
       </mc:AlternateContent>
-      <mc:AlternateContent xmlns:mc="http://schemas.openxmlformats.org/markup-compatibility/2006">
-        <mc:Choice xmlns:p14="http://schemas.microsoft.com/office/powerpoint/2010/main" Requires="p14">
+      <mc:AlternateContent xmlns:mc="http://schemas.openxmlformats.org/markup-compatibility/2006" xmlns:p14="http://schemas.microsoft.com/office/powerpoint/2010/main">
+        <mc:Choice Requires="p14">
           <p:contentPart p14:bwMode="auto" r:id="rId7">
             <p14:nvContentPartPr>
               <p14:cNvPr id="6" name="Ink 5">
@@ -8108,7 +8114,7 @@
             </p14:xfrm>
           </p:contentPart>
         </mc:Choice>
-        <mc:Fallback>
+        <mc:Fallback xmlns="">
           <p:pic>
             <p:nvPicPr>
               <p:cNvPr id="6" name="Ink 5">
@@ -8219,8 +8225,8 @@
             <a:chExt cx="552960" cy="82800"/>
           </a:xfrm>
         </p:grpSpPr>
-        <mc:AlternateContent xmlns:mc="http://schemas.openxmlformats.org/markup-compatibility/2006">
-          <mc:Choice xmlns:p14="http://schemas.microsoft.com/office/powerpoint/2010/main" Requires="p14">
+        <mc:AlternateContent xmlns:mc="http://schemas.openxmlformats.org/markup-compatibility/2006" xmlns:p14="http://schemas.microsoft.com/office/powerpoint/2010/main">
+          <mc:Choice Requires="p14">
             <p:contentPart p14:bwMode="auto" r:id="rId3">
               <p14:nvContentPartPr>
                 <p14:cNvPr id="4" name="Ink 3">
@@ -8239,7 +8245,7 @@
               </p14:xfrm>
             </p:contentPart>
           </mc:Choice>
-          <mc:Fallback>
+          <mc:Fallback xmlns="">
             <p:pic>
               <p:nvPicPr>
                 <p:cNvPr id="4" name="Ink 3">
@@ -8270,8 +8276,8 @@
             </p:pic>
           </mc:Fallback>
         </mc:AlternateContent>
-        <mc:AlternateContent xmlns:mc="http://schemas.openxmlformats.org/markup-compatibility/2006">
-          <mc:Choice xmlns:p14="http://schemas.microsoft.com/office/powerpoint/2010/main" Requires="p14">
+        <mc:AlternateContent xmlns:mc="http://schemas.openxmlformats.org/markup-compatibility/2006" xmlns:p14="http://schemas.microsoft.com/office/powerpoint/2010/main">
+          <mc:Choice Requires="p14">
             <p:contentPart p14:bwMode="auto" r:id="rId5">
               <p14:nvContentPartPr>
                 <p14:cNvPr id="5" name="Ink 4">
@@ -8290,7 +8296,7 @@
               </p14:xfrm>
             </p:contentPart>
           </mc:Choice>
-          <mc:Fallback>
+          <mc:Fallback xmlns="">
             <p:pic>
               <p:nvPicPr>
                 <p:cNvPr id="5" name="Ink 4">
@@ -8322,8 +8328,8 @@
           </mc:Fallback>
         </mc:AlternateContent>
       </p:grpSp>
-      <mc:AlternateContent xmlns:mc="http://schemas.openxmlformats.org/markup-compatibility/2006">
-        <mc:Choice xmlns:p14="http://schemas.microsoft.com/office/powerpoint/2010/main" Requires="p14">
+      <mc:AlternateContent xmlns:mc="http://schemas.openxmlformats.org/markup-compatibility/2006" xmlns:p14="http://schemas.microsoft.com/office/powerpoint/2010/main">
+        <mc:Choice Requires="p14">
           <p:contentPart p14:bwMode="auto" r:id="rId7">
             <p14:nvContentPartPr>
               <p14:cNvPr id="7" name="Ink 6">
@@ -8342,7 +8348,7 @@
             </p14:xfrm>
           </p:contentPart>
         </mc:Choice>
-        <mc:Fallback>
+        <mc:Fallback xmlns="">
           <p:pic>
             <p:nvPicPr>
               <p:cNvPr id="7" name="Ink 6">
@@ -8373,8 +8379,8 @@
           </p:pic>
         </mc:Fallback>
       </mc:AlternateContent>
-      <mc:AlternateContent xmlns:mc="http://schemas.openxmlformats.org/markup-compatibility/2006">
-        <mc:Choice xmlns:p14="http://schemas.microsoft.com/office/powerpoint/2010/main" Requires="p14">
+      <mc:AlternateContent xmlns:mc="http://schemas.openxmlformats.org/markup-compatibility/2006" xmlns:p14="http://schemas.microsoft.com/office/powerpoint/2010/main">
+        <mc:Choice Requires="p14">
           <p:contentPart p14:bwMode="auto" r:id="rId9">
             <p14:nvContentPartPr>
               <p14:cNvPr id="8" name="Ink 7">
@@ -8393,7 +8399,7 @@
             </p14:xfrm>
           </p:contentPart>
         </mc:Choice>
-        <mc:Fallback>
+        <mc:Fallback xmlns="">
           <p:pic>
             <p:nvPicPr>
               <p:cNvPr id="8" name="Ink 7">
@@ -8424,8 +8430,8 @@
           </p:pic>
         </mc:Fallback>
       </mc:AlternateContent>
-      <mc:AlternateContent xmlns:mc="http://schemas.openxmlformats.org/markup-compatibility/2006">
-        <mc:Choice xmlns:p14="http://schemas.microsoft.com/office/powerpoint/2010/main" Requires="p14">
+      <mc:AlternateContent xmlns:mc="http://schemas.openxmlformats.org/markup-compatibility/2006" xmlns:p14="http://schemas.microsoft.com/office/powerpoint/2010/main">
+        <mc:Choice Requires="p14">
           <p:contentPart p14:bwMode="auto" r:id="rId11">
             <p14:nvContentPartPr>
               <p14:cNvPr id="9" name="Ink 8">
@@ -8444,7 +8450,7 @@
             </p14:xfrm>
           </p:contentPart>
         </mc:Choice>
-        <mc:Fallback>
+        <mc:Fallback xmlns="">
           <p:pic>
             <p:nvPicPr>
               <p:cNvPr id="9" name="Ink 8">
@@ -8475,8 +8481,8 @@
           </p:pic>
         </mc:Fallback>
       </mc:AlternateContent>
-      <mc:AlternateContent xmlns:mc="http://schemas.openxmlformats.org/markup-compatibility/2006">
-        <mc:Choice xmlns:p14="http://schemas.microsoft.com/office/powerpoint/2010/main" Requires="p14">
+      <mc:AlternateContent xmlns:mc="http://schemas.openxmlformats.org/markup-compatibility/2006" xmlns:p14="http://schemas.microsoft.com/office/powerpoint/2010/main">
+        <mc:Choice Requires="p14">
           <p:contentPart p14:bwMode="auto" r:id="rId13">
             <p14:nvContentPartPr>
               <p14:cNvPr id="10" name="Ink 9">
@@ -8495,7 +8501,7 @@
             </p14:xfrm>
           </p:contentPart>
         </mc:Choice>
-        <mc:Fallback>
+        <mc:Fallback xmlns="">
           <p:pic>
             <p:nvPicPr>
               <p:cNvPr id="10" name="Ink 9">
@@ -8526,8 +8532,8 @@
           </p:pic>
         </mc:Fallback>
       </mc:AlternateContent>
-      <mc:AlternateContent xmlns:mc="http://schemas.openxmlformats.org/markup-compatibility/2006">
-        <mc:Choice xmlns:p14="http://schemas.microsoft.com/office/powerpoint/2010/main" Requires="p14">
+      <mc:AlternateContent xmlns:mc="http://schemas.openxmlformats.org/markup-compatibility/2006" xmlns:p14="http://schemas.microsoft.com/office/powerpoint/2010/main">
+        <mc:Choice Requires="p14">
           <p:contentPart p14:bwMode="auto" r:id="rId15">
             <p14:nvContentPartPr>
               <p14:cNvPr id="12" name="Ink 11">
@@ -8546,7 +8552,7 @@
             </p14:xfrm>
           </p:contentPart>
         </mc:Choice>
-        <mc:Fallback>
+        <mc:Fallback xmlns="">
           <p:pic>
             <p:nvPicPr>
               <p:cNvPr id="12" name="Ink 11">
@@ -8577,8 +8583,8 @@
           </p:pic>
         </mc:Fallback>
       </mc:AlternateContent>
-      <mc:AlternateContent xmlns:mc="http://schemas.openxmlformats.org/markup-compatibility/2006">
-        <mc:Choice xmlns:p14="http://schemas.microsoft.com/office/powerpoint/2010/main" Requires="p14">
+      <mc:AlternateContent xmlns:mc="http://schemas.openxmlformats.org/markup-compatibility/2006" xmlns:p14="http://schemas.microsoft.com/office/powerpoint/2010/main">
+        <mc:Choice Requires="p14">
           <p:contentPart p14:bwMode="auto" r:id="rId16">
             <p14:nvContentPartPr>
               <p14:cNvPr id="13" name="Ink 12">
@@ -8597,7 +8603,7 @@
             </p14:xfrm>
           </p:contentPart>
         </mc:Choice>
-        <mc:Fallback>
+        <mc:Fallback xmlns="">
           <p:pic>
             <p:nvPicPr>
               <p:cNvPr id="13" name="Ink 12">
@@ -8628,8 +8634,8 @@
           </p:pic>
         </mc:Fallback>
       </mc:AlternateContent>
-      <mc:AlternateContent xmlns:mc="http://schemas.openxmlformats.org/markup-compatibility/2006">
-        <mc:Choice xmlns:p14="http://schemas.microsoft.com/office/powerpoint/2010/main" Requires="p14">
+      <mc:AlternateContent xmlns:mc="http://schemas.openxmlformats.org/markup-compatibility/2006" xmlns:p14="http://schemas.microsoft.com/office/powerpoint/2010/main">
+        <mc:Choice Requires="p14">
           <p:contentPart p14:bwMode="auto" r:id="rId18">
             <p14:nvContentPartPr>
               <p14:cNvPr id="14" name="Ink 13">
@@ -8648,7 +8654,7 @@
             </p14:xfrm>
           </p:contentPart>
         </mc:Choice>
-        <mc:Fallback>
+        <mc:Fallback xmlns="">
           <p:pic>
             <p:nvPicPr>
               <p:cNvPr id="14" name="Ink 13">
@@ -8679,8 +8685,8 @@
           </p:pic>
         </mc:Fallback>
       </mc:AlternateContent>
-      <mc:AlternateContent xmlns:mc="http://schemas.openxmlformats.org/markup-compatibility/2006">
-        <mc:Choice xmlns:p14="http://schemas.microsoft.com/office/powerpoint/2010/main" Requires="p14">
+      <mc:AlternateContent xmlns:mc="http://schemas.openxmlformats.org/markup-compatibility/2006" xmlns:p14="http://schemas.microsoft.com/office/powerpoint/2010/main">
+        <mc:Choice Requires="p14">
           <p:contentPart p14:bwMode="auto" r:id="rId20">
             <p14:nvContentPartPr>
               <p14:cNvPr id="16" name="Ink 15">
@@ -8699,7 +8705,7 @@
             </p14:xfrm>
           </p:contentPart>
         </mc:Choice>
-        <mc:Fallback>
+        <mc:Fallback xmlns="">
           <p:pic>
             <p:nvPicPr>
               <p:cNvPr id="16" name="Ink 15">
@@ -8730,8 +8736,8 @@
           </p:pic>
         </mc:Fallback>
       </mc:AlternateContent>
-      <mc:AlternateContent xmlns:mc="http://schemas.openxmlformats.org/markup-compatibility/2006">
-        <mc:Choice xmlns:p14="http://schemas.microsoft.com/office/powerpoint/2010/main" Requires="p14">
+      <mc:AlternateContent xmlns:mc="http://schemas.openxmlformats.org/markup-compatibility/2006" xmlns:p14="http://schemas.microsoft.com/office/powerpoint/2010/main">
+        <mc:Choice Requires="p14">
           <p:contentPart p14:bwMode="auto" r:id="rId22">
             <p14:nvContentPartPr>
               <p14:cNvPr id="17" name="Ink 16">
@@ -8750,7 +8756,7 @@
             </p14:xfrm>
           </p:contentPart>
         </mc:Choice>
-        <mc:Fallback>
+        <mc:Fallback xmlns="">
           <p:pic>
             <p:nvPicPr>
               <p:cNvPr id="17" name="Ink 16">
@@ -8781,8 +8787,8 @@
           </p:pic>
         </mc:Fallback>
       </mc:AlternateContent>
-      <mc:AlternateContent xmlns:mc="http://schemas.openxmlformats.org/markup-compatibility/2006">
-        <mc:Choice xmlns:p14="http://schemas.microsoft.com/office/powerpoint/2010/main" Requires="p14">
+      <mc:AlternateContent xmlns:mc="http://schemas.openxmlformats.org/markup-compatibility/2006" xmlns:p14="http://schemas.microsoft.com/office/powerpoint/2010/main">
+        <mc:Choice Requires="p14">
           <p:contentPart p14:bwMode="auto" r:id="rId24">
             <p14:nvContentPartPr>
               <p14:cNvPr id="18" name="Ink 17">
@@ -8801,7 +8807,7 @@
             </p14:xfrm>
           </p:contentPart>
         </mc:Choice>
-        <mc:Fallback>
+        <mc:Fallback xmlns="">
           <p:pic>
             <p:nvPicPr>
               <p:cNvPr id="18" name="Ink 17">
@@ -8832,8 +8838,8 @@
           </p:pic>
         </mc:Fallback>
       </mc:AlternateContent>
-      <mc:AlternateContent xmlns:mc="http://schemas.openxmlformats.org/markup-compatibility/2006">
-        <mc:Choice xmlns:p14="http://schemas.microsoft.com/office/powerpoint/2010/main" Requires="p14">
+      <mc:AlternateContent xmlns:mc="http://schemas.openxmlformats.org/markup-compatibility/2006" xmlns:p14="http://schemas.microsoft.com/office/powerpoint/2010/main">
+        <mc:Choice Requires="p14">
           <p:contentPart p14:bwMode="auto" r:id="rId26">
             <p14:nvContentPartPr>
               <p14:cNvPr id="19" name="Ink 18">
@@ -8852,7 +8858,7 @@
             </p14:xfrm>
           </p:contentPart>
         </mc:Choice>
-        <mc:Fallback>
+        <mc:Fallback xmlns="">
           <p:pic>
             <p:nvPicPr>
               <p:cNvPr id="19" name="Ink 18">
@@ -8883,8 +8889,8 @@
           </p:pic>
         </mc:Fallback>
       </mc:AlternateContent>
-      <mc:AlternateContent xmlns:mc="http://schemas.openxmlformats.org/markup-compatibility/2006">
-        <mc:Choice xmlns:p14="http://schemas.microsoft.com/office/powerpoint/2010/main" Requires="p14">
+      <mc:AlternateContent xmlns:mc="http://schemas.openxmlformats.org/markup-compatibility/2006" xmlns:p14="http://schemas.microsoft.com/office/powerpoint/2010/main">
+        <mc:Choice Requires="p14">
           <p:contentPart p14:bwMode="auto" r:id="rId28">
             <p14:nvContentPartPr>
               <p14:cNvPr id="20" name="Ink 19">
@@ -8903,7 +8909,7 @@
             </p14:xfrm>
           </p:contentPart>
         </mc:Choice>
-        <mc:Fallback>
+        <mc:Fallback xmlns="">
           <p:pic>
             <p:nvPicPr>
               <p:cNvPr id="20" name="Ink 19">
@@ -8954,8 +8960,8 @@
             <a:chExt cx="677880" cy="311760"/>
           </a:xfrm>
         </p:grpSpPr>
-        <mc:AlternateContent xmlns:mc="http://schemas.openxmlformats.org/markup-compatibility/2006">
-          <mc:Choice xmlns:p14="http://schemas.microsoft.com/office/powerpoint/2010/main" Requires="p14">
+        <mc:AlternateContent xmlns:mc="http://schemas.openxmlformats.org/markup-compatibility/2006" xmlns:p14="http://schemas.microsoft.com/office/powerpoint/2010/main">
+          <mc:Choice Requires="p14">
             <p:contentPart p14:bwMode="auto" r:id="rId30">
               <p14:nvContentPartPr>
                 <p14:cNvPr id="21" name="Ink 20">
@@ -8974,7 +8980,7 @@
               </p14:xfrm>
             </p:contentPart>
           </mc:Choice>
-          <mc:Fallback>
+          <mc:Fallback xmlns="">
             <p:pic>
               <p:nvPicPr>
                 <p:cNvPr id="21" name="Ink 20">
@@ -9005,8 +9011,8 @@
             </p:pic>
           </mc:Fallback>
         </mc:AlternateContent>
-        <mc:AlternateContent xmlns:mc="http://schemas.openxmlformats.org/markup-compatibility/2006">
-          <mc:Choice xmlns:p14="http://schemas.microsoft.com/office/powerpoint/2010/main" Requires="p14">
+        <mc:AlternateContent xmlns:mc="http://schemas.openxmlformats.org/markup-compatibility/2006" xmlns:p14="http://schemas.microsoft.com/office/powerpoint/2010/main">
+          <mc:Choice Requires="p14">
             <p:contentPart p14:bwMode="auto" r:id="rId32">
               <p14:nvContentPartPr>
                 <p14:cNvPr id="22" name="Ink 21">
@@ -9025,7 +9031,7 @@
               </p14:xfrm>
             </p:contentPart>
           </mc:Choice>
-          <mc:Fallback>
+          <mc:Fallback xmlns="">
             <p:pic>
               <p:nvPicPr>
                 <p:cNvPr id="22" name="Ink 21">
@@ -9242,8 +9248,8 @@
           </a:prstGeom>
         </p:spPr>
       </p:pic>
-      <mc:AlternateContent xmlns:mc="http://schemas.openxmlformats.org/markup-compatibility/2006">
-        <mc:Choice xmlns:p14="http://schemas.microsoft.com/office/powerpoint/2010/main" Requires="p14">
+      <mc:AlternateContent xmlns:mc="http://schemas.openxmlformats.org/markup-compatibility/2006" xmlns:p14="http://schemas.microsoft.com/office/powerpoint/2010/main">
+        <mc:Choice Requires="p14">
           <p:contentPart p14:bwMode="auto" r:id="rId3">
             <p14:nvContentPartPr>
               <p14:cNvPr id="10" name="Ink 9">
@@ -9262,7 +9268,7 @@
             </p14:xfrm>
           </p:contentPart>
         </mc:Choice>
-        <mc:Fallback>
+        <mc:Fallback xmlns="">
           <p:pic>
             <p:nvPicPr>
               <p:cNvPr id="10" name="Ink 9">
@@ -9293,8 +9299,8 @@
           </p:pic>
         </mc:Fallback>
       </mc:AlternateContent>
-      <mc:AlternateContent xmlns:mc="http://schemas.openxmlformats.org/markup-compatibility/2006">
-        <mc:Choice xmlns:p14="http://schemas.microsoft.com/office/powerpoint/2010/main" Requires="p14">
+      <mc:AlternateContent xmlns:mc="http://schemas.openxmlformats.org/markup-compatibility/2006" xmlns:p14="http://schemas.microsoft.com/office/powerpoint/2010/main">
+        <mc:Choice Requires="p14">
           <p:contentPart p14:bwMode="auto" r:id="rId5">
             <p14:nvContentPartPr>
               <p14:cNvPr id="11" name="Ink 10">
@@ -9313,7 +9319,7 @@
             </p14:xfrm>
           </p:contentPart>
         </mc:Choice>
-        <mc:Fallback>
+        <mc:Fallback xmlns="">
           <p:pic>
             <p:nvPicPr>
               <p:cNvPr id="11" name="Ink 10">
@@ -9344,8 +9350,8 @@
           </p:pic>
         </mc:Fallback>
       </mc:AlternateContent>
-      <mc:AlternateContent xmlns:mc="http://schemas.openxmlformats.org/markup-compatibility/2006">
-        <mc:Choice xmlns:p14="http://schemas.microsoft.com/office/powerpoint/2010/main" Requires="p14">
+      <mc:AlternateContent xmlns:mc="http://schemas.openxmlformats.org/markup-compatibility/2006" xmlns:p14="http://schemas.microsoft.com/office/powerpoint/2010/main">
+        <mc:Choice Requires="p14">
           <p:contentPart p14:bwMode="auto" r:id="rId7">
             <p14:nvContentPartPr>
               <p14:cNvPr id="12" name="Ink 11">
@@ -9364,7 +9370,7 @@
             </p14:xfrm>
           </p:contentPart>
         </mc:Choice>
-        <mc:Fallback>
+        <mc:Fallback xmlns="">
           <p:pic>
             <p:nvPicPr>
               <p:cNvPr id="12" name="Ink 11">
@@ -9395,8 +9401,8 @@
           </p:pic>
         </mc:Fallback>
       </mc:AlternateContent>
-      <mc:AlternateContent xmlns:mc="http://schemas.openxmlformats.org/markup-compatibility/2006">
-        <mc:Choice xmlns:p14="http://schemas.microsoft.com/office/powerpoint/2010/main" Requires="p14">
+      <mc:AlternateContent xmlns:mc="http://schemas.openxmlformats.org/markup-compatibility/2006" xmlns:p14="http://schemas.microsoft.com/office/powerpoint/2010/main">
+        <mc:Choice Requires="p14">
           <p:contentPart p14:bwMode="auto" r:id="rId9">
             <p14:nvContentPartPr>
               <p14:cNvPr id="13" name="Ink 12">
@@ -9415,7 +9421,7 @@
             </p14:xfrm>
           </p:contentPart>
         </mc:Choice>
-        <mc:Fallback>
+        <mc:Fallback xmlns="">
           <p:pic>
             <p:nvPicPr>
               <p:cNvPr id="13" name="Ink 12">
@@ -9446,8 +9452,8 @@
           </p:pic>
         </mc:Fallback>
       </mc:AlternateContent>
-      <mc:AlternateContent xmlns:mc="http://schemas.openxmlformats.org/markup-compatibility/2006">
-        <mc:Choice xmlns:p14="http://schemas.microsoft.com/office/powerpoint/2010/main" Requires="p14">
+      <mc:AlternateContent xmlns:mc="http://schemas.openxmlformats.org/markup-compatibility/2006" xmlns:p14="http://schemas.microsoft.com/office/powerpoint/2010/main">
+        <mc:Choice Requires="p14">
           <p:contentPart p14:bwMode="auto" r:id="rId11">
             <p14:nvContentPartPr>
               <p14:cNvPr id="14" name="Ink 13">
@@ -9466,7 +9472,7 @@
             </p14:xfrm>
           </p:contentPart>
         </mc:Choice>
-        <mc:Fallback>
+        <mc:Fallback xmlns="">
           <p:pic>
             <p:nvPicPr>
               <p:cNvPr id="14" name="Ink 13">
@@ -9497,8 +9503,8 @@
           </p:pic>
         </mc:Fallback>
       </mc:AlternateContent>
-      <mc:AlternateContent xmlns:mc="http://schemas.openxmlformats.org/markup-compatibility/2006">
-        <mc:Choice xmlns:p14="http://schemas.microsoft.com/office/powerpoint/2010/main" Requires="p14">
+      <mc:AlternateContent xmlns:mc="http://schemas.openxmlformats.org/markup-compatibility/2006" xmlns:p14="http://schemas.microsoft.com/office/powerpoint/2010/main">
+        <mc:Choice Requires="p14">
           <p:contentPart p14:bwMode="auto" r:id="rId13">
             <p14:nvContentPartPr>
               <p14:cNvPr id="15" name="Ink 14">
@@ -9517,7 +9523,7 @@
             </p14:xfrm>
           </p:contentPart>
         </mc:Choice>
-        <mc:Fallback>
+        <mc:Fallback xmlns="">
           <p:pic>
             <p:nvPicPr>
               <p:cNvPr id="15" name="Ink 14">
@@ -9548,8 +9554,8 @@
           </p:pic>
         </mc:Fallback>
       </mc:AlternateContent>
-      <mc:AlternateContent xmlns:mc="http://schemas.openxmlformats.org/markup-compatibility/2006">
-        <mc:Choice xmlns:p14="http://schemas.microsoft.com/office/powerpoint/2010/main" Requires="p14">
+      <mc:AlternateContent xmlns:mc="http://schemas.openxmlformats.org/markup-compatibility/2006" xmlns:p14="http://schemas.microsoft.com/office/powerpoint/2010/main">
+        <mc:Choice Requires="p14">
           <p:contentPart p14:bwMode="auto" r:id="rId15">
             <p14:nvContentPartPr>
               <p14:cNvPr id="16" name="Ink 15">
@@ -9568,7 +9574,7 @@
             </p14:xfrm>
           </p:contentPart>
         </mc:Choice>
-        <mc:Fallback>
+        <mc:Fallback xmlns="">
           <p:pic>
             <p:nvPicPr>
               <p:cNvPr id="16" name="Ink 15">
@@ -9599,8 +9605,8 @@
           </p:pic>
         </mc:Fallback>
       </mc:AlternateContent>
-      <mc:AlternateContent xmlns:mc="http://schemas.openxmlformats.org/markup-compatibility/2006">
-        <mc:Choice xmlns:p14="http://schemas.microsoft.com/office/powerpoint/2010/main" Requires="p14">
+      <mc:AlternateContent xmlns:mc="http://schemas.openxmlformats.org/markup-compatibility/2006" xmlns:p14="http://schemas.microsoft.com/office/powerpoint/2010/main">
+        <mc:Choice Requires="p14">
           <p:contentPart p14:bwMode="auto" r:id="rId17">
             <p14:nvContentPartPr>
               <p14:cNvPr id="17" name="Ink 16">
@@ -9619,7 +9625,7 @@
             </p14:xfrm>
           </p:contentPart>
         </mc:Choice>
-        <mc:Fallback>
+        <mc:Fallback xmlns="">
           <p:pic>
             <p:nvPicPr>
               <p:cNvPr id="17" name="Ink 16">
@@ -9650,8 +9656,8 @@
           </p:pic>
         </mc:Fallback>
       </mc:AlternateContent>
-      <mc:AlternateContent xmlns:mc="http://schemas.openxmlformats.org/markup-compatibility/2006">
-        <mc:Choice xmlns:p14="http://schemas.microsoft.com/office/powerpoint/2010/main" Requires="p14">
+      <mc:AlternateContent xmlns:mc="http://schemas.openxmlformats.org/markup-compatibility/2006" xmlns:p14="http://schemas.microsoft.com/office/powerpoint/2010/main">
+        <mc:Choice Requires="p14">
           <p:contentPart p14:bwMode="auto" r:id="rId19">
             <p14:nvContentPartPr>
               <p14:cNvPr id="21" name="Ink 20">
@@ -9670,7 +9676,7 @@
             </p14:xfrm>
           </p:contentPart>
         </mc:Choice>
-        <mc:Fallback>
+        <mc:Fallback xmlns="">
           <p:pic>
             <p:nvPicPr>
               <p:cNvPr id="21" name="Ink 20">
@@ -9701,8 +9707,8 @@
           </p:pic>
         </mc:Fallback>
       </mc:AlternateContent>
-      <mc:AlternateContent xmlns:mc="http://schemas.openxmlformats.org/markup-compatibility/2006">
-        <mc:Choice xmlns:p14="http://schemas.microsoft.com/office/powerpoint/2010/main" Requires="p14">
+      <mc:AlternateContent xmlns:mc="http://schemas.openxmlformats.org/markup-compatibility/2006" xmlns:p14="http://schemas.microsoft.com/office/powerpoint/2010/main">
+        <mc:Choice Requires="p14">
           <p:contentPart p14:bwMode="auto" r:id="rId21">
             <p14:nvContentPartPr>
               <p14:cNvPr id="22" name="Ink 21">
@@ -9721,7 +9727,7 @@
             </p14:xfrm>
           </p:contentPart>
         </mc:Choice>
-        <mc:Fallback>
+        <mc:Fallback xmlns="">
           <p:pic>
             <p:nvPicPr>
               <p:cNvPr id="22" name="Ink 21">
@@ -9752,8 +9758,8 @@
           </p:pic>
         </mc:Fallback>
       </mc:AlternateContent>
-      <mc:AlternateContent xmlns:mc="http://schemas.openxmlformats.org/markup-compatibility/2006">
-        <mc:Choice xmlns:p14="http://schemas.microsoft.com/office/powerpoint/2010/main" Requires="p14">
+      <mc:AlternateContent xmlns:mc="http://schemas.openxmlformats.org/markup-compatibility/2006" xmlns:p14="http://schemas.microsoft.com/office/powerpoint/2010/main">
+        <mc:Choice Requires="p14">
           <p:contentPart p14:bwMode="auto" r:id="rId23">
             <p14:nvContentPartPr>
               <p14:cNvPr id="25" name="Ink 24">
@@ -9772,7 +9778,7 @@
             </p14:xfrm>
           </p:contentPart>
         </mc:Choice>
-        <mc:Fallback>
+        <mc:Fallback xmlns="">
           <p:pic>
             <p:nvPicPr>
               <p:cNvPr id="25" name="Ink 24">
@@ -9803,8 +9809,8 @@
           </p:pic>
         </mc:Fallback>
       </mc:AlternateContent>
-      <mc:AlternateContent xmlns:mc="http://schemas.openxmlformats.org/markup-compatibility/2006">
-        <mc:Choice xmlns:p14="http://schemas.microsoft.com/office/powerpoint/2010/main" Requires="p14">
+      <mc:AlternateContent xmlns:mc="http://schemas.openxmlformats.org/markup-compatibility/2006" xmlns:p14="http://schemas.microsoft.com/office/powerpoint/2010/main">
+        <mc:Choice Requires="p14">
           <p:contentPart p14:bwMode="auto" r:id="rId25">
             <p14:nvContentPartPr>
               <p14:cNvPr id="26" name="Ink 25">
@@ -9823,7 +9829,7 @@
             </p14:xfrm>
           </p:contentPart>
         </mc:Choice>
-        <mc:Fallback>
+        <mc:Fallback xmlns="">
           <p:pic>
             <p:nvPicPr>
               <p:cNvPr id="26" name="Ink 25">
@@ -9854,8 +9860,8 @@
           </p:pic>
         </mc:Fallback>
       </mc:AlternateContent>
-      <mc:AlternateContent xmlns:mc="http://schemas.openxmlformats.org/markup-compatibility/2006">
-        <mc:Choice xmlns:p14="http://schemas.microsoft.com/office/powerpoint/2010/main" Requires="p14">
+      <mc:AlternateContent xmlns:mc="http://schemas.openxmlformats.org/markup-compatibility/2006" xmlns:p14="http://schemas.microsoft.com/office/powerpoint/2010/main">
+        <mc:Choice Requires="p14">
           <p:contentPart p14:bwMode="auto" r:id="rId27">
             <p14:nvContentPartPr>
               <p14:cNvPr id="27" name="Ink 26">
@@ -9874,7 +9880,7 @@
             </p14:xfrm>
           </p:contentPart>
         </mc:Choice>
-        <mc:Fallback>
+        <mc:Fallback xmlns="">
           <p:pic>
             <p:nvPicPr>
               <p:cNvPr id="27" name="Ink 26">
@@ -9905,8 +9911,8 @@
           </p:pic>
         </mc:Fallback>
       </mc:AlternateContent>
-      <mc:AlternateContent xmlns:mc="http://schemas.openxmlformats.org/markup-compatibility/2006">
-        <mc:Choice xmlns:p14="http://schemas.microsoft.com/office/powerpoint/2010/main" Requires="p14">
+      <mc:AlternateContent xmlns:mc="http://schemas.openxmlformats.org/markup-compatibility/2006" xmlns:p14="http://schemas.microsoft.com/office/powerpoint/2010/main">
+        <mc:Choice Requires="p14">
           <p:contentPart p14:bwMode="auto" r:id="rId29">
             <p14:nvContentPartPr>
               <p14:cNvPr id="29" name="Ink 28">
@@ -9925,7 +9931,7 @@
             </p14:xfrm>
           </p:contentPart>
         </mc:Choice>
-        <mc:Fallback>
+        <mc:Fallback xmlns="">
           <p:pic>
             <p:nvPicPr>
               <p:cNvPr id="29" name="Ink 28">
@@ -9956,8 +9962,8 @@
           </p:pic>
         </mc:Fallback>
       </mc:AlternateContent>
-      <mc:AlternateContent xmlns:mc="http://schemas.openxmlformats.org/markup-compatibility/2006">
-        <mc:Choice xmlns:p14="http://schemas.microsoft.com/office/powerpoint/2010/main" Requires="p14">
+      <mc:AlternateContent xmlns:mc="http://schemas.openxmlformats.org/markup-compatibility/2006" xmlns:p14="http://schemas.microsoft.com/office/powerpoint/2010/main">
+        <mc:Choice Requires="p14">
           <p:contentPart p14:bwMode="auto" r:id="rId31">
             <p14:nvContentPartPr>
               <p14:cNvPr id="30" name="Ink 29">
@@ -9976,7 +9982,7 @@
             </p14:xfrm>
           </p:contentPart>
         </mc:Choice>
-        <mc:Fallback>
+        <mc:Fallback xmlns="">
           <p:pic>
             <p:nvPicPr>
               <p:cNvPr id="30" name="Ink 29">
@@ -10067,8 +10073,8 @@
           </a:prstGeom>
         </p:spPr>
       </p:pic>
-      <mc:AlternateContent xmlns:mc="http://schemas.openxmlformats.org/markup-compatibility/2006">
-        <mc:Choice xmlns:p14="http://schemas.microsoft.com/office/powerpoint/2010/main" Requires="p14">
+      <mc:AlternateContent xmlns:mc="http://schemas.openxmlformats.org/markup-compatibility/2006" xmlns:p14="http://schemas.microsoft.com/office/powerpoint/2010/main">
+        <mc:Choice Requires="p14">
           <p:contentPart p14:bwMode="auto" r:id="rId3">
             <p14:nvContentPartPr>
               <p14:cNvPr id="8" name="Ink 7">
@@ -10087,7 +10093,7 @@
             </p14:xfrm>
           </p:contentPart>
         </mc:Choice>
-        <mc:Fallback>
+        <mc:Fallback xmlns="">
           <p:pic>
             <p:nvPicPr>
               <p:cNvPr id="8" name="Ink 7">
@@ -10118,8 +10124,8 @@
           </p:pic>
         </mc:Fallback>
       </mc:AlternateContent>
-      <mc:AlternateContent xmlns:mc="http://schemas.openxmlformats.org/markup-compatibility/2006">
-        <mc:Choice xmlns:p14="http://schemas.microsoft.com/office/powerpoint/2010/main" Requires="p14">
+      <mc:AlternateContent xmlns:mc="http://schemas.openxmlformats.org/markup-compatibility/2006" xmlns:p14="http://schemas.microsoft.com/office/powerpoint/2010/main">
+        <mc:Choice Requires="p14">
           <p:contentPart p14:bwMode="auto" r:id="rId5">
             <p14:nvContentPartPr>
               <p14:cNvPr id="9" name="Ink 8">
@@ -10138,7 +10144,7 @@
             </p14:xfrm>
           </p:contentPart>
         </mc:Choice>
-        <mc:Fallback>
+        <mc:Fallback xmlns="">
           <p:pic>
             <p:nvPicPr>
               <p:cNvPr id="9" name="Ink 8">
@@ -10169,8 +10175,8 @@
           </p:pic>
         </mc:Fallback>
       </mc:AlternateContent>
-      <mc:AlternateContent xmlns:mc="http://schemas.openxmlformats.org/markup-compatibility/2006">
-        <mc:Choice xmlns:p14="http://schemas.microsoft.com/office/powerpoint/2010/main" Requires="p14">
+      <mc:AlternateContent xmlns:mc="http://schemas.openxmlformats.org/markup-compatibility/2006" xmlns:p14="http://schemas.microsoft.com/office/powerpoint/2010/main">
+        <mc:Choice Requires="p14">
           <p:contentPart p14:bwMode="auto" r:id="rId7">
             <p14:nvContentPartPr>
               <p14:cNvPr id="11" name="Ink 10">
@@ -10189,7 +10195,7 @@
             </p14:xfrm>
           </p:contentPart>
         </mc:Choice>
-        <mc:Fallback>
+        <mc:Fallback xmlns="">
           <p:pic>
             <p:nvPicPr>
               <p:cNvPr id="11" name="Ink 10">
@@ -10220,8 +10226,8 @@
           </p:pic>
         </mc:Fallback>
       </mc:AlternateContent>
-      <mc:AlternateContent xmlns:mc="http://schemas.openxmlformats.org/markup-compatibility/2006">
-        <mc:Choice xmlns:p14="http://schemas.microsoft.com/office/powerpoint/2010/main" Requires="p14">
+      <mc:AlternateContent xmlns:mc="http://schemas.openxmlformats.org/markup-compatibility/2006" xmlns:p14="http://schemas.microsoft.com/office/powerpoint/2010/main">
+        <mc:Choice Requires="p14">
           <p:contentPart p14:bwMode="auto" r:id="rId9">
             <p14:nvContentPartPr>
               <p14:cNvPr id="12" name="Ink 11">
@@ -10240,7 +10246,7 @@
             </p14:xfrm>
           </p:contentPart>
         </mc:Choice>
-        <mc:Fallback>
+        <mc:Fallback xmlns="">
           <p:pic>
             <p:nvPicPr>
               <p:cNvPr id="12" name="Ink 11">
@@ -10271,8 +10277,8 @@
           </p:pic>
         </mc:Fallback>
       </mc:AlternateContent>
-      <mc:AlternateContent xmlns:mc="http://schemas.openxmlformats.org/markup-compatibility/2006">
-        <mc:Choice xmlns:p14="http://schemas.microsoft.com/office/powerpoint/2010/main" Requires="p14">
+      <mc:AlternateContent xmlns:mc="http://schemas.openxmlformats.org/markup-compatibility/2006" xmlns:p14="http://schemas.microsoft.com/office/powerpoint/2010/main">
+        <mc:Choice Requires="p14">
           <p:contentPart p14:bwMode="auto" r:id="rId11">
             <p14:nvContentPartPr>
               <p14:cNvPr id="14" name="Ink 13">
@@ -10291,7 +10297,7 @@
             </p14:xfrm>
           </p:contentPart>
         </mc:Choice>
-        <mc:Fallback>
+        <mc:Fallback xmlns="">
           <p:pic>
             <p:nvPicPr>
               <p:cNvPr id="14" name="Ink 13">
@@ -10322,8 +10328,8 @@
           </p:pic>
         </mc:Fallback>
       </mc:AlternateContent>
-      <mc:AlternateContent xmlns:mc="http://schemas.openxmlformats.org/markup-compatibility/2006">
-        <mc:Choice xmlns:p14="http://schemas.microsoft.com/office/powerpoint/2010/main" Requires="p14">
+      <mc:AlternateContent xmlns:mc="http://schemas.openxmlformats.org/markup-compatibility/2006" xmlns:p14="http://schemas.microsoft.com/office/powerpoint/2010/main">
+        <mc:Choice Requires="p14">
           <p:contentPart p14:bwMode="auto" r:id="rId13">
             <p14:nvContentPartPr>
               <p14:cNvPr id="15" name="Ink 14">
@@ -10342,7 +10348,7 @@
             </p14:xfrm>
           </p:contentPart>
         </mc:Choice>
-        <mc:Fallback>
+        <mc:Fallback xmlns="">
           <p:pic>
             <p:nvPicPr>
               <p:cNvPr id="15" name="Ink 14">
@@ -10373,8 +10379,8 @@
           </p:pic>
         </mc:Fallback>
       </mc:AlternateContent>
-      <mc:AlternateContent xmlns:mc="http://schemas.openxmlformats.org/markup-compatibility/2006">
-        <mc:Choice xmlns:p14="http://schemas.microsoft.com/office/powerpoint/2010/main" Requires="p14">
+      <mc:AlternateContent xmlns:mc="http://schemas.openxmlformats.org/markup-compatibility/2006" xmlns:p14="http://schemas.microsoft.com/office/powerpoint/2010/main">
+        <mc:Choice Requires="p14">
           <p:contentPart p14:bwMode="auto" r:id="rId15">
             <p14:nvContentPartPr>
               <p14:cNvPr id="16" name="Ink 15">
@@ -10393,7 +10399,7 @@
             </p14:xfrm>
           </p:contentPart>
         </mc:Choice>
-        <mc:Fallback>
+        <mc:Fallback xmlns="">
           <p:pic>
             <p:nvPicPr>
               <p:cNvPr id="16" name="Ink 15">
@@ -10424,8 +10430,8 @@
           </p:pic>
         </mc:Fallback>
       </mc:AlternateContent>
-      <mc:AlternateContent xmlns:mc="http://schemas.openxmlformats.org/markup-compatibility/2006">
-        <mc:Choice xmlns:p14="http://schemas.microsoft.com/office/powerpoint/2010/main" Requires="p14">
+      <mc:AlternateContent xmlns:mc="http://schemas.openxmlformats.org/markup-compatibility/2006" xmlns:p14="http://schemas.microsoft.com/office/powerpoint/2010/main">
+        <mc:Choice Requires="p14">
           <p:contentPart p14:bwMode="auto" r:id="rId17">
             <p14:nvContentPartPr>
               <p14:cNvPr id="21" name="Ink 20">
@@ -10444,7 +10450,7 @@
             </p14:xfrm>
           </p:contentPart>
         </mc:Choice>
-        <mc:Fallback>
+        <mc:Fallback xmlns="">
           <p:pic>
             <p:nvPicPr>
               <p:cNvPr id="21" name="Ink 20">
@@ -10475,8 +10481,8 @@
           </p:pic>
         </mc:Fallback>
       </mc:AlternateContent>
-      <mc:AlternateContent xmlns:mc="http://schemas.openxmlformats.org/markup-compatibility/2006">
-        <mc:Choice xmlns:p14="http://schemas.microsoft.com/office/powerpoint/2010/main" Requires="p14">
+      <mc:AlternateContent xmlns:mc="http://schemas.openxmlformats.org/markup-compatibility/2006" xmlns:p14="http://schemas.microsoft.com/office/powerpoint/2010/main">
+        <mc:Choice Requires="p14">
           <p:contentPart p14:bwMode="auto" r:id="rId19">
             <p14:nvContentPartPr>
               <p14:cNvPr id="22" name="Ink 21">
@@ -10495,7 +10501,7 @@
             </p14:xfrm>
           </p:contentPart>
         </mc:Choice>
-        <mc:Fallback>
+        <mc:Fallback xmlns="">
           <p:pic>
             <p:nvPicPr>
               <p:cNvPr id="22" name="Ink 21">
@@ -10526,8 +10532,8 @@
           </p:pic>
         </mc:Fallback>
       </mc:AlternateContent>
-      <mc:AlternateContent xmlns:mc="http://schemas.openxmlformats.org/markup-compatibility/2006">
-        <mc:Choice xmlns:p14="http://schemas.microsoft.com/office/powerpoint/2010/main" Requires="p14">
+      <mc:AlternateContent xmlns:mc="http://schemas.openxmlformats.org/markup-compatibility/2006" xmlns:p14="http://schemas.microsoft.com/office/powerpoint/2010/main">
+        <mc:Choice Requires="p14">
           <p:contentPart p14:bwMode="auto" r:id="rId21">
             <p14:nvContentPartPr>
               <p14:cNvPr id="23" name="Ink 22">
@@ -10546,7 +10552,7 @@
             </p14:xfrm>
           </p:contentPart>
         </mc:Choice>
-        <mc:Fallback>
+        <mc:Fallback xmlns="">
           <p:pic>
             <p:nvPicPr>
               <p:cNvPr id="23" name="Ink 22">
@@ -10577,8 +10583,8 @@
           </p:pic>
         </mc:Fallback>
       </mc:AlternateContent>
-      <mc:AlternateContent xmlns:mc="http://schemas.openxmlformats.org/markup-compatibility/2006">
-        <mc:Choice xmlns:p14="http://schemas.microsoft.com/office/powerpoint/2010/main" Requires="p14">
+      <mc:AlternateContent xmlns:mc="http://schemas.openxmlformats.org/markup-compatibility/2006" xmlns:p14="http://schemas.microsoft.com/office/powerpoint/2010/main">
+        <mc:Choice Requires="p14">
           <p:contentPart p14:bwMode="auto" r:id="rId23">
             <p14:nvContentPartPr>
               <p14:cNvPr id="24" name="Ink 23">
@@ -10597,7 +10603,7 @@
             </p14:xfrm>
           </p:contentPart>
         </mc:Choice>
-        <mc:Fallback>
+        <mc:Fallback xmlns="">
           <p:pic>
             <p:nvPicPr>
               <p:cNvPr id="24" name="Ink 23">
@@ -10628,8 +10634,8 @@
           </p:pic>
         </mc:Fallback>
       </mc:AlternateContent>
-      <mc:AlternateContent xmlns:mc="http://schemas.openxmlformats.org/markup-compatibility/2006">
-        <mc:Choice xmlns:p14="http://schemas.microsoft.com/office/powerpoint/2010/main" Requires="p14">
+      <mc:AlternateContent xmlns:mc="http://schemas.openxmlformats.org/markup-compatibility/2006" xmlns:p14="http://schemas.microsoft.com/office/powerpoint/2010/main">
+        <mc:Choice Requires="p14">
           <p:contentPart p14:bwMode="auto" r:id="rId25">
             <p14:nvContentPartPr>
               <p14:cNvPr id="25" name="Ink 24">
@@ -10648,7 +10654,7 @@
             </p14:xfrm>
           </p:contentPart>
         </mc:Choice>
-        <mc:Fallback>
+        <mc:Fallback xmlns="">
           <p:pic>
             <p:nvPicPr>
               <p:cNvPr id="25" name="Ink 24">
@@ -10679,8 +10685,8 @@
           </p:pic>
         </mc:Fallback>
       </mc:AlternateContent>
-      <mc:AlternateContent xmlns:mc="http://schemas.openxmlformats.org/markup-compatibility/2006">
-        <mc:Choice xmlns:p14="http://schemas.microsoft.com/office/powerpoint/2010/main" Requires="p14">
+      <mc:AlternateContent xmlns:mc="http://schemas.openxmlformats.org/markup-compatibility/2006" xmlns:p14="http://schemas.microsoft.com/office/powerpoint/2010/main">
+        <mc:Choice Requires="p14">
           <p:contentPart p14:bwMode="auto" r:id="rId27">
             <p14:nvContentPartPr>
               <p14:cNvPr id="26" name="Ink 25">
@@ -10699,7 +10705,7 @@
             </p14:xfrm>
           </p:contentPart>
         </mc:Choice>
-        <mc:Fallback>
+        <mc:Fallback xmlns="">
           <p:pic>
             <p:nvPicPr>
               <p:cNvPr id="26" name="Ink 25">
@@ -10730,8 +10736,8 @@
           </p:pic>
         </mc:Fallback>
       </mc:AlternateContent>
-      <mc:AlternateContent xmlns:mc="http://schemas.openxmlformats.org/markup-compatibility/2006">
-        <mc:Choice xmlns:p14="http://schemas.microsoft.com/office/powerpoint/2010/main" Requires="p14">
+      <mc:AlternateContent xmlns:mc="http://schemas.openxmlformats.org/markup-compatibility/2006" xmlns:p14="http://schemas.microsoft.com/office/powerpoint/2010/main">
+        <mc:Choice Requires="p14">
           <p:contentPart p14:bwMode="auto" r:id="rId29">
             <p14:nvContentPartPr>
               <p14:cNvPr id="27" name="Ink 26">
@@ -10750,7 +10756,7 @@
             </p14:xfrm>
           </p:contentPart>
         </mc:Choice>
-        <mc:Fallback>
+        <mc:Fallback xmlns="">
           <p:pic>
             <p:nvPicPr>
               <p:cNvPr id="27" name="Ink 26">
@@ -10781,8 +10787,8 @@
           </p:pic>
         </mc:Fallback>
       </mc:AlternateContent>
-      <mc:AlternateContent xmlns:mc="http://schemas.openxmlformats.org/markup-compatibility/2006">
-        <mc:Choice xmlns:p14="http://schemas.microsoft.com/office/powerpoint/2010/main" Requires="p14">
+      <mc:AlternateContent xmlns:mc="http://schemas.openxmlformats.org/markup-compatibility/2006" xmlns:p14="http://schemas.microsoft.com/office/powerpoint/2010/main">
+        <mc:Choice Requires="p14">
           <p:contentPart p14:bwMode="auto" r:id="rId31">
             <p14:nvContentPartPr>
               <p14:cNvPr id="28" name="Ink 27">
@@ -10801,7 +10807,7 @@
             </p14:xfrm>
           </p:contentPart>
         </mc:Choice>
-        <mc:Fallback>
+        <mc:Fallback xmlns="">
           <p:pic>
             <p:nvPicPr>
               <p:cNvPr id="28" name="Ink 27">
@@ -10852,8 +10858,8 @@
             <a:chExt cx="1295280" cy="989640"/>
           </a:xfrm>
         </p:grpSpPr>
-        <mc:AlternateContent xmlns:mc="http://schemas.openxmlformats.org/markup-compatibility/2006">
-          <mc:Choice xmlns:p14="http://schemas.microsoft.com/office/powerpoint/2010/main" Requires="p14">
+        <mc:AlternateContent xmlns:mc="http://schemas.openxmlformats.org/markup-compatibility/2006" xmlns:p14="http://schemas.microsoft.com/office/powerpoint/2010/main">
+          <mc:Choice Requires="p14">
             <p:contentPart p14:bwMode="auto" r:id="rId33">
               <p14:nvContentPartPr>
                 <p14:cNvPr id="29" name="Ink 28">
@@ -10872,7 +10878,7 @@
               </p14:xfrm>
             </p:contentPart>
           </mc:Choice>
-          <mc:Fallback>
+          <mc:Fallback xmlns="">
             <p:pic>
               <p:nvPicPr>
                 <p:cNvPr id="29" name="Ink 28">
@@ -10903,8 +10909,8 @@
             </p:pic>
           </mc:Fallback>
         </mc:AlternateContent>
-        <mc:AlternateContent xmlns:mc="http://schemas.openxmlformats.org/markup-compatibility/2006">
-          <mc:Choice xmlns:p14="http://schemas.microsoft.com/office/powerpoint/2010/main" Requires="p14">
+        <mc:AlternateContent xmlns:mc="http://schemas.openxmlformats.org/markup-compatibility/2006" xmlns:p14="http://schemas.microsoft.com/office/powerpoint/2010/main">
+          <mc:Choice Requires="p14">
             <p:contentPart p14:bwMode="auto" r:id="rId35">
               <p14:nvContentPartPr>
                 <p14:cNvPr id="30" name="Ink 29">
@@ -10923,7 +10929,7 @@
               </p14:xfrm>
             </p:contentPart>
           </mc:Choice>
-          <mc:Fallback>
+          <mc:Fallback xmlns="">
             <p:pic>
               <p:nvPicPr>
                 <p:cNvPr id="30" name="Ink 29">
@@ -10954,8 +10960,8 @@
             </p:pic>
           </mc:Fallback>
         </mc:AlternateContent>
-        <mc:AlternateContent xmlns:mc="http://schemas.openxmlformats.org/markup-compatibility/2006">
-          <mc:Choice xmlns:p14="http://schemas.microsoft.com/office/powerpoint/2010/main" Requires="p14">
+        <mc:AlternateContent xmlns:mc="http://schemas.openxmlformats.org/markup-compatibility/2006" xmlns:p14="http://schemas.microsoft.com/office/powerpoint/2010/main">
+          <mc:Choice Requires="p14">
             <p:contentPart p14:bwMode="auto" r:id="rId37">
               <p14:nvContentPartPr>
                 <p14:cNvPr id="32" name="Ink 31">
@@ -10974,7 +10980,7 @@
               </p14:xfrm>
             </p:contentPart>
           </mc:Choice>
-          <mc:Fallback>
+          <mc:Fallback xmlns="">
             <p:pic>
               <p:nvPicPr>
                 <p:cNvPr id="32" name="Ink 31">
@@ -11006,8 +11012,8 @@
           </mc:Fallback>
         </mc:AlternateContent>
       </p:grpSp>
-      <mc:AlternateContent xmlns:mc="http://schemas.openxmlformats.org/markup-compatibility/2006">
-        <mc:Choice xmlns:p14="http://schemas.microsoft.com/office/powerpoint/2010/main" Requires="p14">
+      <mc:AlternateContent xmlns:mc="http://schemas.openxmlformats.org/markup-compatibility/2006" xmlns:p14="http://schemas.microsoft.com/office/powerpoint/2010/main">
+        <mc:Choice Requires="p14">
           <p:contentPart p14:bwMode="auto" r:id="rId39">
             <p14:nvContentPartPr>
               <p14:cNvPr id="34" name="Ink 33">
@@ -11026,7 +11032,7 @@
             </p14:xfrm>
           </p:contentPart>
         </mc:Choice>
-        <mc:Fallback>
+        <mc:Fallback xmlns="">
           <p:pic>
             <p:nvPicPr>
               <p:cNvPr id="34" name="Ink 33">
@@ -11057,8 +11063,8 @@
           </p:pic>
         </mc:Fallback>
       </mc:AlternateContent>
-      <mc:AlternateContent xmlns:mc="http://schemas.openxmlformats.org/markup-compatibility/2006">
-        <mc:Choice xmlns:p14="http://schemas.microsoft.com/office/powerpoint/2010/main" Requires="p14">
+      <mc:AlternateContent xmlns:mc="http://schemas.openxmlformats.org/markup-compatibility/2006" xmlns:p14="http://schemas.microsoft.com/office/powerpoint/2010/main">
+        <mc:Choice Requires="p14">
           <p:contentPart p14:bwMode="auto" r:id="rId41">
             <p14:nvContentPartPr>
               <p14:cNvPr id="35" name="Ink 34">
@@ -11077,7 +11083,7 @@
             </p14:xfrm>
           </p:contentPart>
         </mc:Choice>
-        <mc:Fallback>
+        <mc:Fallback xmlns="">
           <p:pic>
             <p:nvPicPr>
               <p:cNvPr id="35" name="Ink 34">
@@ -11118,11 +11124,11 @@
   <p:clrMapOvr>
     <a:masterClrMapping/>
   </p:clrMapOvr>
-  <mc:AlternateContent xmlns:mc="http://schemas.openxmlformats.org/markup-compatibility/2006">
-    <mc:Choice xmlns:p14="http://schemas.microsoft.com/office/powerpoint/2010/main" Requires="p14">
+  <mc:AlternateContent xmlns:mc="http://schemas.openxmlformats.org/markup-compatibility/2006" xmlns:p14="http://schemas.microsoft.com/office/powerpoint/2010/main">
+    <mc:Choice Requires="p14">
       <p:transition spd="slow" p14:dur="2000" advClick="0"/>
     </mc:Choice>
-    <mc:Fallback>
+    <mc:Fallback xmlns="">
       <p:transition spd="slow" advClick="0"/>
     </mc:Fallback>
   </mc:AlternateContent>
@@ -11176,8 +11182,8 @@
           </a:prstGeom>
         </p:spPr>
       </p:pic>
-      <mc:AlternateContent xmlns:mc="http://schemas.openxmlformats.org/markup-compatibility/2006">
-        <mc:Choice xmlns:p14="http://schemas.microsoft.com/office/powerpoint/2010/main" Requires="p14">
+      <mc:AlternateContent xmlns:mc="http://schemas.openxmlformats.org/markup-compatibility/2006" xmlns:p14="http://schemas.microsoft.com/office/powerpoint/2010/main">
+        <mc:Choice Requires="p14">
           <p:contentPart p14:bwMode="auto" r:id="rId3">
             <p14:nvContentPartPr>
               <p14:cNvPr id="4" name="Ink 3">
@@ -11196,7 +11202,7 @@
             </p14:xfrm>
           </p:contentPart>
         </mc:Choice>
-        <mc:Fallback>
+        <mc:Fallback xmlns="">
           <p:pic>
             <p:nvPicPr>
               <p:cNvPr id="4" name="Ink 3">
@@ -11227,8 +11233,8 @@
           </p:pic>
         </mc:Fallback>
       </mc:AlternateContent>
-      <mc:AlternateContent xmlns:mc="http://schemas.openxmlformats.org/markup-compatibility/2006">
-        <mc:Choice xmlns:p14="http://schemas.microsoft.com/office/powerpoint/2010/main" Requires="p14">
+      <mc:AlternateContent xmlns:mc="http://schemas.openxmlformats.org/markup-compatibility/2006" xmlns:p14="http://schemas.microsoft.com/office/powerpoint/2010/main">
+        <mc:Choice Requires="p14">
           <p:contentPart p14:bwMode="auto" r:id="rId5">
             <p14:nvContentPartPr>
               <p14:cNvPr id="5" name="Ink 4">
@@ -11247,7 +11253,7 @@
             </p14:xfrm>
           </p:contentPart>
         </mc:Choice>
-        <mc:Fallback>
+        <mc:Fallback xmlns="">
           <p:pic>
             <p:nvPicPr>
               <p:cNvPr id="5" name="Ink 4">
@@ -11278,8 +11284,8 @@
           </p:pic>
         </mc:Fallback>
       </mc:AlternateContent>
-      <mc:AlternateContent xmlns:mc="http://schemas.openxmlformats.org/markup-compatibility/2006">
-        <mc:Choice xmlns:p14="http://schemas.microsoft.com/office/powerpoint/2010/main" Requires="p14">
+      <mc:AlternateContent xmlns:mc="http://schemas.openxmlformats.org/markup-compatibility/2006" xmlns:p14="http://schemas.microsoft.com/office/powerpoint/2010/main">
+        <mc:Choice Requires="p14">
           <p:contentPart p14:bwMode="auto" r:id="rId7">
             <p14:nvContentPartPr>
               <p14:cNvPr id="6" name="Ink 5">
@@ -11298,7 +11304,7 @@
             </p14:xfrm>
           </p:contentPart>
         </mc:Choice>
-        <mc:Fallback>
+        <mc:Fallback xmlns="">
           <p:pic>
             <p:nvPicPr>
               <p:cNvPr id="6" name="Ink 5">
@@ -11329,8 +11335,8 @@
           </p:pic>
         </mc:Fallback>
       </mc:AlternateContent>
-      <mc:AlternateContent xmlns:mc="http://schemas.openxmlformats.org/markup-compatibility/2006">
-        <mc:Choice xmlns:p14="http://schemas.microsoft.com/office/powerpoint/2010/main" Requires="p14">
+      <mc:AlternateContent xmlns:mc="http://schemas.openxmlformats.org/markup-compatibility/2006" xmlns:p14="http://schemas.microsoft.com/office/powerpoint/2010/main">
+        <mc:Choice Requires="p14">
           <p:contentPart p14:bwMode="auto" r:id="rId9">
             <p14:nvContentPartPr>
               <p14:cNvPr id="7" name="Ink 6">
@@ -11349,7 +11355,7 @@
             </p14:xfrm>
           </p:contentPart>
         </mc:Choice>
-        <mc:Fallback>
+        <mc:Fallback xmlns="">
           <p:pic>
             <p:nvPicPr>
               <p:cNvPr id="7" name="Ink 6">
@@ -11380,8 +11386,8 @@
           </p:pic>
         </mc:Fallback>
       </mc:AlternateContent>
-      <mc:AlternateContent xmlns:mc="http://schemas.openxmlformats.org/markup-compatibility/2006">
-        <mc:Choice xmlns:p14="http://schemas.microsoft.com/office/powerpoint/2010/main" Requires="p14">
+      <mc:AlternateContent xmlns:mc="http://schemas.openxmlformats.org/markup-compatibility/2006" xmlns:p14="http://schemas.microsoft.com/office/powerpoint/2010/main">
+        <mc:Choice Requires="p14">
           <p:contentPart p14:bwMode="auto" r:id="rId11">
             <p14:nvContentPartPr>
               <p14:cNvPr id="8" name="Ink 7">
@@ -11400,7 +11406,7 @@
             </p14:xfrm>
           </p:contentPart>
         </mc:Choice>
-        <mc:Fallback>
+        <mc:Fallback xmlns="">
           <p:pic>
             <p:nvPicPr>
               <p:cNvPr id="8" name="Ink 7">
@@ -11431,8 +11437,8 @@
           </p:pic>
         </mc:Fallback>
       </mc:AlternateContent>
-      <mc:AlternateContent xmlns:mc="http://schemas.openxmlformats.org/markup-compatibility/2006">
-        <mc:Choice xmlns:p14="http://schemas.microsoft.com/office/powerpoint/2010/main" Requires="p14">
+      <mc:AlternateContent xmlns:mc="http://schemas.openxmlformats.org/markup-compatibility/2006" xmlns:p14="http://schemas.microsoft.com/office/powerpoint/2010/main">
+        <mc:Choice Requires="p14">
           <p:contentPart p14:bwMode="auto" r:id="rId13">
             <p14:nvContentPartPr>
               <p14:cNvPr id="9" name="Ink 8">
@@ -11451,7 +11457,7 @@
             </p14:xfrm>
           </p:contentPart>
         </mc:Choice>
-        <mc:Fallback>
+        <mc:Fallback xmlns="">
           <p:pic>
             <p:nvPicPr>
               <p:cNvPr id="9" name="Ink 8">
@@ -11482,8 +11488,8 @@
           </p:pic>
         </mc:Fallback>
       </mc:AlternateContent>
-      <mc:AlternateContent xmlns:mc="http://schemas.openxmlformats.org/markup-compatibility/2006">
-        <mc:Choice xmlns:p14="http://schemas.microsoft.com/office/powerpoint/2010/main" Requires="p14">
+      <mc:AlternateContent xmlns:mc="http://schemas.openxmlformats.org/markup-compatibility/2006" xmlns:p14="http://schemas.microsoft.com/office/powerpoint/2010/main">
+        <mc:Choice Requires="p14">
           <p:contentPart p14:bwMode="auto" r:id="rId15">
             <p14:nvContentPartPr>
               <p14:cNvPr id="10" name="Ink 9">
@@ -11502,7 +11508,7 @@
             </p14:xfrm>
           </p:contentPart>
         </mc:Choice>
-        <mc:Fallback>
+        <mc:Fallback xmlns="">
           <p:pic>
             <p:nvPicPr>
               <p:cNvPr id="10" name="Ink 9">
@@ -11533,8 +11539,8 @@
           </p:pic>
         </mc:Fallback>
       </mc:AlternateContent>
-      <mc:AlternateContent xmlns:mc="http://schemas.openxmlformats.org/markup-compatibility/2006">
-        <mc:Choice xmlns:p14="http://schemas.microsoft.com/office/powerpoint/2010/main" Requires="p14">
+      <mc:AlternateContent xmlns:mc="http://schemas.openxmlformats.org/markup-compatibility/2006" xmlns:p14="http://schemas.microsoft.com/office/powerpoint/2010/main">
+        <mc:Choice Requires="p14">
           <p:contentPart p14:bwMode="auto" r:id="rId17">
             <p14:nvContentPartPr>
               <p14:cNvPr id="11" name="Ink 10">
@@ -11553,7 +11559,7 @@
             </p14:xfrm>
           </p:contentPart>
         </mc:Choice>
-        <mc:Fallback>
+        <mc:Fallback xmlns="">
           <p:pic>
             <p:nvPicPr>
               <p:cNvPr id="11" name="Ink 10">
@@ -11584,8 +11590,8 @@
           </p:pic>
         </mc:Fallback>
       </mc:AlternateContent>
-      <mc:AlternateContent xmlns:mc="http://schemas.openxmlformats.org/markup-compatibility/2006">
-        <mc:Choice xmlns:p14="http://schemas.microsoft.com/office/powerpoint/2010/main" Requires="p14">
+      <mc:AlternateContent xmlns:mc="http://schemas.openxmlformats.org/markup-compatibility/2006" xmlns:p14="http://schemas.microsoft.com/office/powerpoint/2010/main">
+        <mc:Choice Requires="p14">
           <p:contentPart p14:bwMode="auto" r:id="rId19">
             <p14:nvContentPartPr>
               <p14:cNvPr id="12" name="Ink 11">
@@ -11604,7 +11610,7 @@
             </p14:xfrm>
           </p:contentPart>
         </mc:Choice>
-        <mc:Fallback>
+        <mc:Fallback xmlns="">
           <p:pic>
             <p:nvPicPr>
               <p:cNvPr id="12" name="Ink 11">
@@ -11635,8 +11641,8 @@
           </p:pic>
         </mc:Fallback>
       </mc:AlternateContent>
-      <mc:AlternateContent xmlns:mc="http://schemas.openxmlformats.org/markup-compatibility/2006">
-        <mc:Choice xmlns:p14="http://schemas.microsoft.com/office/powerpoint/2010/main" Requires="p14">
+      <mc:AlternateContent xmlns:mc="http://schemas.openxmlformats.org/markup-compatibility/2006" xmlns:p14="http://schemas.microsoft.com/office/powerpoint/2010/main">
+        <mc:Choice Requires="p14">
           <p:contentPart p14:bwMode="auto" r:id="rId21">
             <p14:nvContentPartPr>
               <p14:cNvPr id="13" name="Ink 12">
@@ -11655,7 +11661,7 @@
             </p14:xfrm>
           </p:contentPart>
         </mc:Choice>
-        <mc:Fallback>
+        <mc:Fallback xmlns="">
           <p:pic>
             <p:nvPicPr>
               <p:cNvPr id="13" name="Ink 12">
@@ -11746,8 +11752,8 @@
           </a:prstGeom>
         </p:spPr>
       </p:pic>
-      <mc:AlternateContent xmlns:mc="http://schemas.openxmlformats.org/markup-compatibility/2006">
-        <mc:Choice xmlns:p14="http://schemas.microsoft.com/office/powerpoint/2010/main" Requires="p14">
+      <mc:AlternateContent xmlns:mc="http://schemas.openxmlformats.org/markup-compatibility/2006" xmlns:p14="http://schemas.microsoft.com/office/powerpoint/2010/main">
+        <mc:Choice Requires="p14">
           <p:contentPart p14:bwMode="auto" r:id="rId3">
             <p14:nvContentPartPr>
               <p14:cNvPr id="4" name="Ink 3">
@@ -11766,7 +11772,7 @@
             </p14:xfrm>
           </p:contentPart>
         </mc:Choice>
-        <mc:Fallback>
+        <mc:Fallback xmlns="">
           <p:pic>
             <p:nvPicPr>
               <p:cNvPr id="4" name="Ink 3">
@@ -11797,8 +11803,8 @@
           </p:pic>
         </mc:Fallback>
       </mc:AlternateContent>
-      <mc:AlternateContent xmlns:mc="http://schemas.openxmlformats.org/markup-compatibility/2006">
-        <mc:Choice xmlns:p14="http://schemas.microsoft.com/office/powerpoint/2010/main" Requires="p14">
+      <mc:AlternateContent xmlns:mc="http://schemas.openxmlformats.org/markup-compatibility/2006" xmlns:p14="http://schemas.microsoft.com/office/powerpoint/2010/main">
+        <mc:Choice Requires="p14">
           <p:contentPart p14:bwMode="auto" r:id="rId5">
             <p14:nvContentPartPr>
               <p14:cNvPr id="7" name="Ink 6">
@@ -11817,7 +11823,7 @@
             </p14:xfrm>
           </p:contentPart>
         </mc:Choice>
-        <mc:Fallback>
+        <mc:Fallback xmlns="">
           <p:pic>
             <p:nvPicPr>
               <p:cNvPr id="7" name="Ink 6">
@@ -11848,8 +11854,8 @@
           </p:pic>
         </mc:Fallback>
       </mc:AlternateContent>
-      <mc:AlternateContent xmlns:mc="http://schemas.openxmlformats.org/markup-compatibility/2006">
-        <mc:Choice xmlns:p14="http://schemas.microsoft.com/office/powerpoint/2010/main" Requires="p14">
+      <mc:AlternateContent xmlns:mc="http://schemas.openxmlformats.org/markup-compatibility/2006" xmlns:p14="http://schemas.microsoft.com/office/powerpoint/2010/main">
+        <mc:Choice Requires="p14">
           <p:contentPart p14:bwMode="auto" r:id="rId7">
             <p14:nvContentPartPr>
               <p14:cNvPr id="8" name="Ink 7">
@@ -11868,7 +11874,7 @@
             </p14:xfrm>
           </p:contentPart>
         </mc:Choice>
-        <mc:Fallback>
+        <mc:Fallback xmlns="">
           <p:pic>
             <p:nvPicPr>
               <p:cNvPr id="8" name="Ink 7">
@@ -11899,8 +11905,8 @@
           </p:pic>
         </mc:Fallback>
       </mc:AlternateContent>
-      <mc:AlternateContent xmlns:mc="http://schemas.openxmlformats.org/markup-compatibility/2006">
-        <mc:Choice xmlns:p14="http://schemas.microsoft.com/office/powerpoint/2010/main" Requires="p14">
+      <mc:AlternateContent xmlns:mc="http://schemas.openxmlformats.org/markup-compatibility/2006" xmlns:p14="http://schemas.microsoft.com/office/powerpoint/2010/main">
+        <mc:Choice Requires="p14">
           <p:contentPart p14:bwMode="auto" r:id="rId9">
             <p14:nvContentPartPr>
               <p14:cNvPr id="14" name="Ink 13">
@@ -11919,7 +11925,7 @@
             </p14:xfrm>
           </p:contentPart>
         </mc:Choice>
-        <mc:Fallback>
+        <mc:Fallback xmlns="">
           <p:pic>
             <p:nvPicPr>
               <p:cNvPr id="14" name="Ink 13">
@@ -11970,8 +11976,8 @@
             <a:chExt cx="2046960" cy="438480"/>
           </a:xfrm>
         </p:grpSpPr>
-        <mc:AlternateContent xmlns:mc="http://schemas.openxmlformats.org/markup-compatibility/2006">
-          <mc:Choice xmlns:p14="http://schemas.microsoft.com/office/powerpoint/2010/main" Requires="p14">
+        <mc:AlternateContent xmlns:mc="http://schemas.openxmlformats.org/markup-compatibility/2006" xmlns:p14="http://schemas.microsoft.com/office/powerpoint/2010/main">
+          <mc:Choice Requires="p14">
             <p:contentPart p14:bwMode="auto" r:id="rId11">
               <p14:nvContentPartPr>
                 <p14:cNvPr id="9" name="Ink 8">
@@ -11990,7 +11996,7 @@
               </p14:xfrm>
             </p:contentPart>
           </mc:Choice>
-          <mc:Fallback>
+          <mc:Fallback xmlns="">
             <p:pic>
               <p:nvPicPr>
                 <p:cNvPr id="9" name="Ink 8">
@@ -12021,8 +12027,8 @@
             </p:pic>
           </mc:Fallback>
         </mc:AlternateContent>
-        <mc:AlternateContent xmlns:mc="http://schemas.openxmlformats.org/markup-compatibility/2006">
-          <mc:Choice xmlns:p14="http://schemas.microsoft.com/office/powerpoint/2010/main" Requires="p14">
+        <mc:AlternateContent xmlns:mc="http://schemas.openxmlformats.org/markup-compatibility/2006" xmlns:p14="http://schemas.microsoft.com/office/powerpoint/2010/main">
+          <mc:Choice Requires="p14">
             <p:contentPart p14:bwMode="auto" r:id="rId13">
               <p14:nvContentPartPr>
                 <p14:cNvPr id="10" name="Ink 9">
@@ -12041,7 +12047,7 @@
               </p14:xfrm>
             </p:contentPart>
           </mc:Choice>
-          <mc:Fallback>
+          <mc:Fallback xmlns="">
             <p:pic>
               <p:nvPicPr>
                 <p:cNvPr id="10" name="Ink 9">
@@ -12072,8 +12078,8 @@
             </p:pic>
           </mc:Fallback>
         </mc:AlternateContent>
-        <mc:AlternateContent xmlns:mc="http://schemas.openxmlformats.org/markup-compatibility/2006">
-          <mc:Choice xmlns:p14="http://schemas.microsoft.com/office/powerpoint/2010/main" Requires="p14">
+        <mc:AlternateContent xmlns:mc="http://schemas.openxmlformats.org/markup-compatibility/2006" xmlns:p14="http://schemas.microsoft.com/office/powerpoint/2010/main">
+          <mc:Choice Requires="p14">
             <p:contentPart p14:bwMode="auto" r:id="rId15">
               <p14:nvContentPartPr>
                 <p14:cNvPr id="12" name="Ink 11">
@@ -12092,7 +12098,7 @@
               </p14:xfrm>
             </p:contentPart>
           </mc:Choice>
-          <mc:Fallback>
+          <mc:Fallback xmlns="">
             <p:pic>
               <p:nvPicPr>
                 <p:cNvPr id="12" name="Ink 11">
@@ -12123,8 +12129,8 @@
             </p:pic>
           </mc:Fallback>
         </mc:AlternateContent>
-        <mc:AlternateContent xmlns:mc="http://schemas.openxmlformats.org/markup-compatibility/2006">
-          <mc:Choice xmlns:p14="http://schemas.microsoft.com/office/powerpoint/2010/main" Requires="p14">
+        <mc:AlternateContent xmlns:mc="http://schemas.openxmlformats.org/markup-compatibility/2006" xmlns:p14="http://schemas.microsoft.com/office/powerpoint/2010/main">
+          <mc:Choice Requires="p14">
             <p:contentPart p14:bwMode="auto" r:id="rId17">
               <p14:nvContentPartPr>
                 <p14:cNvPr id="16" name="Ink 15">
@@ -12143,7 +12149,7 @@
               </p14:xfrm>
             </p:contentPart>
           </mc:Choice>
-          <mc:Fallback>
+          <mc:Fallback xmlns="">
             <p:pic>
               <p:nvPicPr>
                 <p:cNvPr id="16" name="Ink 15">
@@ -12235,8 +12241,8 @@
           </a:prstGeom>
         </p:spPr>
       </p:pic>
-      <mc:AlternateContent xmlns:mc="http://schemas.openxmlformats.org/markup-compatibility/2006">
-        <mc:Choice xmlns:p14="http://schemas.microsoft.com/office/powerpoint/2010/main" Requires="p14">
+      <mc:AlternateContent xmlns:mc="http://schemas.openxmlformats.org/markup-compatibility/2006" xmlns:p14="http://schemas.microsoft.com/office/powerpoint/2010/main">
+        <mc:Choice Requires="p14">
           <p:contentPart p14:bwMode="auto" r:id="rId3">
             <p14:nvContentPartPr>
               <p14:cNvPr id="4" name="Ink 3">
@@ -12255,7 +12261,7 @@
             </p14:xfrm>
           </p:contentPart>
         </mc:Choice>
-        <mc:Fallback>
+        <mc:Fallback xmlns="">
           <p:pic>
             <p:nvPicPr>
               <p:cNvPr id="4" name="Ink 3">
@@ -12331,7 +12337,7 @@
         <p:spPr>
           <a:xfrm>
             <a:off x="1" y="673100"/>
-            <a:ext cx="3257550" cy="4154984"/>
+            <a:ext cx="3257550" cy="2677656"/>
           </a:xfrm>
           <a:prstGeom prst="rect">
             <a:avLst/>
@@ -12378,7 +12384,7 @@
           <a:p>
             <a:r>
               <a:rPr lang="en-IN" sz="2400" dirty="0"/>
-              <a:t>Alex Singh, who is a software engineer in his 20s, but is very busy with many events and their job</a:t>
+              <a:t>           Alex Singh</a:t>
             </a:r>
           </a:p>
         </p:txBody>
@@ -12443,8 +12449,8 @@
           </a:prstGeom>
         </p:spPr>
       </p:pic>
-      <mc:AlternateContent xmlns:mc="http://schemas.openxmlformats.org/markup-compatibility/2006">
-        <mc:Choice xmlns:p14="http://schemas.microsoft.com/office/powerpoint/2010/main" Requires="p14">
+      <mc:AlternateContent xmlns:mc="http://schemas.openxmlformats.org/markup-compatibility/2006" xmlns:p14="http://schemas.microsoft.com/office/powerpoint/2010/main">
+        <mc:Choice Requires="p14">
           <p:contentPart p14:bwMode="auto" r:id="rId3">
             <p14:nvContentPartPr>
               <p14:cNvPr id="4" name="Ink 3">
@@ -12463,7 +12469,7 @@
             </p14:xfrm>
           </p:contentPart>
         </mc:Choice>
-        <mc:Fallback>
+        <mc:Fallback xmlns="">
           <p:pic>
             <p:nvPicPr>
               <p:cNvPr id="4" name="Ink 3">
@@ -12494,8 +12500,8 @@
           </p:pic>
         </mc:Fallback>
       </mc:AlternateContent>
-      <mc:AlternateContent xmlns:mc="http://schemas.openxmlformats.org/markup-compatibility/2006">
-        <mc:Choice xmlns:p14="http://schemas.microsoft.com/office/powerpoint/2010/main" Requires="p14">
+      <mc:AlternateContent xmlns:mc="http://schemas.openxmlformats.org/markup-compatibility/2006" xmlns:p14="http://schemas.microsoft.com/office/powerpoint/2010/main">
+        <mc:Choice Requires="p14">
           <p:contentPart p14:bwMode="auto" r:id="rId5">
             <p14:nvContentPartPr>
               <p14:cNvPr id="5" name="Ink 4">
@@ -12514,7 +12520,7 @@
             </p14:xfrm>
           </p:contentPart>
         </mc:Choice>
-        <mc:Fallback>
+        <mc:Fallback xmlns="">
           <p:pic>
             <p:nvPicPr>
               <p:cNvPr id="5" name="Ink 4">
@@ -12545,8 +12551,8 @@
           </p:pic>
         </mc:Fallback>
       </mc:AlternateContent>
-      <mc:AlternateContent xmlns:mc="http://schemas.openxmlformats.org/markup-compatibility/2006">
-        <mc:Choice xmlns:p14="http://schemas.microsoft.com/office/powerpoint/2010/main" Requires="p14">
+      <mc:AlternateContent xmlns:mc="http://schemas.openxmlformats.org/markup-compatibility/2006" xmlns:p14="http://schemas.microsoft.com/office/powerpoint/2010/main">
+        <mc:Choice Requires="p14">
           <p:contentPart p14:bwMode="auto" r:id="rId7">
             <p14:nvContentPartPr>
               <p14:cNvPr id="6" name="Ink 5">
@@ -12565,7 +12571,7 @@
             </p14:xfrm>
           </p:contentPart>
         </mc:Choice>
-        <mc:Fallback>
+        <mc:Fallback xmlns="">
           <p:pic>
             <p:nvPicPr>
               <p:cNvPr id="6" name="Ink 5">
@@ -12596,8 +12602,8 @@
           </p:pic>
         </mc:Fallback>
       </mc:AlternateContent>
-      <mc:AlternateContent xmlns:mc="http://schemas.openxmlformats.org/markup-compatibility/2006">
-        <mc:Choice xmlns:p14="http://schemas.microsoft.com/office/powerpoint/2010/main" Requires="p14">
+      <mc:AlternateContent xmlns:mc="http://schemas.openxmlformats.org/markup-compatibility/2006" xmlns:p14="http://schemas.microsoft.com/office/powerpoint/2010/main">
+        <mc:Choice Requires="p14">
           <p:contentPart p14:bwMode="auto" r:id="rId9">
             <p14:nvContentPartPr>
               <p14:cNvPr id="7" name="Ink 6">
@@ -12616,7 +12622,7 @@
             </p14:xfrm>
           </p:contentPart>
         </mc:Choice>
-        <mc:Fallback>
+        <mc:Fallback xmlns="">
           <p:pic>
             <p:nvPicPr>
               <p:cNvPr id="7" name="Ink 6">
@@ -12647,8 +12653,8 @@
           </p:pic>
         </mc:Fallback>
       </mc:AlternateContent>
-      <mc:AlternateContent xmlns:mc="http://schemas.openxmlformats.org/markup-compatibility/2006">
-        <mc:Choice xmlns:p14="http://schemas.microsoft.com/office/powerpoint/2010/main" Requires="p14">
+      <mc:AlternateContent xmlns:mc="http://schemas.openxmlformats.org/markup-compatibility/2006" xmlns:p14="http://schemas.microsoft.com/office/powerpoint/2010/main">
+        <mc:Choice Requires="p14">
           <p:contentPart p14:bwMode="auto" r:id="rId11">
             <p14:nvContentPartPr>
               <p14:cNvPr id="9" name="Ink 8">
@@ -12667,7 +12673,7 @@
             </p14:xfrm>
           </p:contentPart>
         </mc:Choice>
-        <mc:Fallback>
+        <mc:Fallback xmlns="">
           <p:pic>
             <p:nvPicPr>
               <p:cNvPr id="9" name="Ink 8">
@@ -12698,8 +12704,8 @@
           </p:pic>
         </mc:Fallback>
       </mc:AlternateContent>
-      <mc:AlternateContent xmlns:mc="http://schemas.openxmlformats.org/markup-compatibility/2006">
-        <mc:Choice xmlns:p14="http://schemas.microsoft.com/office/powerpoint/2010/main" Requires="p14">
+      <mc:AlternateContent xmlns:mc="http://schemas.openxmlformats.org/markup-compatibility/2006" xmlns:p14="http://schemas.microsoft.com/office/powerpoint/2010/main">
+        <mc:Choice Requires="p14">
           <p:contentPart p14:bwMode="auto" r:id="rId13">
             <p14:nvContentPartPr>
               <p14:cNvPr id="12" name="Ink 11">
@@ -12718,7 +12724,7 @@
             </p14:xfrm>
           </p:contentPart>
         </mc:Choice>
-        <mc:Fallback>
+        <mc:Fallback xmlns="">
           <p:pic>
             <p:nvPicPr>
               <p:cNvPr id="12" name="Ink 11">
@@ -12809,8 +12815,8 @@
           </a:prstGeom>
         </p:spPr>
       </p:pic>
-      <mc:AlternateContent xmlns:mc="http://schemas.openxmlformats.org/markup-compatibility/2006">
-        <mc:Choice xmlns:p14="http://schemas.microsoft.com/office/powerpoint/2010/main" Requires="p14">
+      <mc:AlternateContent xmlns:mc="http://schemas.openxmlformats.org/markup-compatibility/2006" xmlns:p14="http://schemas.microsoft.com/office/powerpoint/2010/main">
+        <mc:Choice Requires="p14">
           <p:contentPart p14:bwMode="auto" r:id="rId3">
             <p14:nvContentPartPr>
               <p14:cNvPr id="4" name="Ink 3">
@@ -12829,7 +12835,7 @@
             </p14:xfrm>
           </p:contentPart>
         </mc:Choice>
-        <mc:Fallback>
+        <mc:Fallback xmlns="">
           <p:pic>
             <p:nvPicPr>
               <p:cNvPr id="4" name="Ink 3">
@@ -12860,8 +12866,8 @@
           </p:pic>
         </mc:Fallback>
       </mc:AlternateContent>
-      <mc:AlternateContent xmlns:mc="http://schemas.openxmlformats.org/markup-compatibility/2006">
-        <mc:Choice xmlns:p14="http://schemas.microsoft.com/office/powerpoint/2010/main" Requires="p14">
+      <mc:AlternateContent xmlns:mc="http://schemas.openxmlformats.org/markup-compatibility/2006" xmlns:p14="http://schemas.microsoft.com/office/powerpoint/2010/main">
+        <mc:Choice Requires="p14">
           <p:contentPart p14:bwMode="auto" r:id="rId5">
             <p14:nvContentPartPr>
               <p14:cNvPr id="7" name="Ink 6">
@@ -12880,7 +12886,7 @@
             </p14:xfrm>
           </p:contentPart>
         </mc:Choice>
-        <mc:Fallback>
+        <mc:Fallback xmlns="">
           <p:pic>
             <p:nvPicPr>
               <p:cNvPr id="7" name="Ink 6">
@@ -12911,8 +12917,8 @@
           </p:pic>
         </mc:Fallback>
       </mc:AlternateContent>
-      <mc:AlternateContent xmlns:mc="http://schemas.openxmlformats.org/markup-compatibility/2006">
-        <mc:Choice xmlns:p14="http://schemas.microsoft.com/office/powerpoint/2010/main" Requires="p14">
+      <mc:AlternateContent xmlns:mc="http://schemas.openxmlformats.org/markup-compatibility/2006" xmlns:p14="http://schemas.microsoft.com/office/powerpoint/2010/main">
+        <mc:Choice Requires="p14">
           <p:contentPart p14:bwMode="auto" r:id="rId7">
             <p14:nvContentPartPr>
               <p14:cNvPr id="8" name="Ink 7">
@@ -12931,7 +12937,7 @@
             </p14:xfrm>
           </p:contentPart>
         </mc:Choice>
-        <mc:Fallback>
+        <mc:Fallback xmlns="">
           <p:pic>
             <p:nvPicPr>
               <p:cNvPr id="8" name="Ink 7">
@@ -12962,8 +12968,8 @@
           </p:pic>
         </mc:Fallback>
       </mc:AlternateContent>
-      <mc:AlternateContent xmlns:mc="http://schemas.openxmlformats.org/markup-compatibility/2006">
-        <mc:Choice xmlns:p14="http://schemas.microsoft.com/office/powerpoint/2010/main" Requires="p14">
+      <mc:AlternateContent xmlns:mc="http://schemas.openxmlformats.org/markup-compatibility/2006" xmlns:p14="http://schemas.microsoft.com/office/powerpoint/2010/main">
+        <mc:Choice Requires="p14">
           <p:contentPart p14:bwMode="auto" r:id="rId9">
             <p14:nvContentPartPr>
               <p14:cNvPr id="9" name="Ink 8">
@@ -12982,7 +12988,7 @@
             </p14:xfrm>
           </p:contentPart>
         </mc:Choice>
-        <mc:Fallback>
+        <mc:Fallback xmlns="">
           <p:pic>
             <p:nvPicPr>
               <p:cNvPr id="9" name="Ink 8">
@@ -13013,8 +13019,8 @@
           </p:pic>
         </mc:Fallback>
       </mc:AlternateContent>
-      <mc:AlternateContent xmlns:mc="http://schemas.openxmlformats.org/markup-compatibility/2006">
-        <mc:Choice xmlns:p14="http://schemas.microsoft.com/office/powerpoint/2010/main" Requires="p14">
+      <mc:AlternateContent xmlns:mc="http://schemas.openxmlformats.org/markup-compatibility/2006" xmlns:p14="http://schemas.microsoft.com/office/powerpoint/2010/main">
+        <mc:Choice Requires="p14">
           <p:contentPart p14:bwMode="auto" r:id="rId11">
             <p14:nvContentPartPr>
               <p14:cNvPr id="10" name="Ink 9">
@@ -13033,7 +13039,7 @@
             </p14:xfrm>
           </p:contentPart>
         </mc:Choice>
-        <mc:Fallback>
+        <mc:Fallback xmlns="">
           <p:pic>
             <p:nvPicPr>
               <p:cNvPr id="10" name="Ink 9">
@@ -13064,8 +13070,8 @@
           </p:pic>
         </mc:Fallback>
       </mc:AlternateContent>
-      <mc:AlternateContent xmlns:mc="http://schemas.openxmlformats.org/markup-compatibility/2006">
-        <mc:Choice xmlns:p14="http://schemas.microsoft.com/office/powerpoint/2010/main" Requires="p14">
+      <mc:AlternateContent xmlns:mc="http://schemas.openxmlformats.org/markup-compatibility/2006" xmlns:p14="http://schemas.microsoft.com/office/powerpoint/2010/main">
+        <mc:Choice Requires="p14">
           <p:contentPart p14:bwMode="auto" r:id="rId13">
             <p14:nvContentPartPr>
               <p14:cNvPr id="12" name="Ink 11">
@@ -13084,7 +13090,7 @@
             </p14:xfrm>
           </p:contentPart>
         </mc:Choice>
-        <mc:Fallback>
+        <mc:Fallback xmlns="">
           <p:pic>
             <p:nvPicPr>
               <p:cNvPr id="12" name="Ink 11">
@@ -13115,8 +13121,8 @@
           </p:pic>
         </mc:Fallback>
       </mc:AlternateContent>
-      <mc:AlternateContent xmlns:mc="http://schemas.openxmlformats.org/markup-compatibility/2006">
-        <mc:Choice xmlns:p14="http://schemas.microsoft.com/office/powerpoint/2010/main" Requires="p14">
+      <mc:AlternateContent xmlns:mc="http://schemas.openxmlformats.org/markup-compatibility/2006" xmlns:p14="http://schemas.microsoft.com/office/powerpoint/2010/main">
+        <mc:Choice Requires="p14">
           <p:contentPart p14:bwMode="auto" r:id="rId15">
             <p14:nvContentPartPr>
               <p14:cNvPr id="15" name="Ink 14">
@@ -13135,7 +13141,7 @@
             </p14:xfrm>
           </p:contentPart>
         </mc:Choice>
-        <mc:Fallback>
+        <mc:Fallback xmlns="">
           <p:pic>
             <p:nvPicPr>
               <p:cNvPr id="15" name="Ink 14">
@@ -13166,8 +13172,8 @@
           </p:pic>
         </mc:Fallback>
       </mc:AlternateContent>
-      <mc:AlternateContent xmlns:mc="http://schemas.openxmlformats.org/markup-compatibility/2006">
-        <mc:Choice xmlns:p14="http://schemas.microsoft.com/office/powerpoint/2010/main" Requires="p14">
+      <mc:AlternateContent xmlns:mc="http://schemas.openxmlformats.org/markup-compatibility/2006" xmlns:p14="http://schemas.microsoft.com/office/powerpoint/2010/main">
+        <mc:Choice Requires="p14">
           <p:contentPart p14:bwMode="auto" r:id="rId17">
             <p14:nvContentPartPr>
               <p14:cNvPr id="16" name="Ink 15">
@@ -13186,7 +13192,7 @@
             </p14:xfrm>
           </p:contentPart>
         </mc:Choice>
-        <mc:Fallback>
+        <mc:Fallback xmlns="">
           <p:pic>
             <p:nvPicPr>
               <p:cNvPr id="16" name="Ink 15">
@@ -13237,8 +13243,8 @@
             <a:chExt cx="145080" cy="91080"/>
           </a:xfrm>
         </p:grpSpPr>
-        <mc:AlternateContent xmlns:mc="http://schemas.openxmlformats.org/markup-compatibility/2006">
-          <mc:Choice xmlns:p14="http://schemas.microsoft.com/office/powerpoint/2010/main" Requires="p14">
+        <mc:AlternateContent xmlns:mc="http://schemas.openxmlformats.org/markup-compatibility/2006" xmlns:p14="http://schemas.microsoft.com/office/powerpoint/2010/main">
+          <mc:Choice Requires="p14">
             <p:contentPart p14:bwMode="auto" r:id="rId19">
               <p14:nvContentPartPr>
                 <p14:cNvPr id="17" name="Ink 16">
@@ -13257,7 +13263,7 @@
               </p14:xfrm>
             </p:contentPart>
           </mc:Choice>
-          <mc:Fallback>
+          <mc:Fallback xmlns="">
             <p:pic>
               <p:nvPicPr>
                 <p:cNvPr id="17" name="Ink 16">
@@ -13288,8 +13294,8 @@
             </p:pic>
           </mc:Fallback>
         </mc:AlternateContent>
-        <mc:AlternateContent xmlns:mc="http://schemas.openxmlformats.org/markup-compatibility/2006">
-          <mc:Choice xmlns:p14="http://schemas.microsoft.com/office/powerpoint/2010/main" Requires="p14">
+        <mc:AlternateContent xmlns:mc="http://schemas.openxmlformats.org/markup-compatibility/2006" xmlns:p14="http://schemas.microsoft.com/office/powerpoint/2010/main">
+          <mc:Choice Requires="p14">
             <p:contentPart p14:bwMode="auto" r:id="rId21">
               <p14:nvContentPartPr>
                 <p14:cNvPr id="18" name="Ink 17">
@@ -13308,7 +13314,7 @@
               </p14:xfrm>
             </p:contentPart>
           </mc:Choice>
-          <mc:Fallback>
+          <mc:Fallback xmlns="">
             <p:pic>
               <p:nvPicPr>
                 <p:cNvPr id="18" name="Ink 17">
@@ -13340,8 +13346,8 @@
           </mc:Fallback>
         </mc:AlternateContent>
       </p:grpSp>
-      <mc:AlternateContent xmlns:mc="http://schemas.openxmlformats.org/markup-compatibility/2006">
-        <mc:Choice xmlns:p14="http://schemas.microsoft.com/office/powerpoint/2010/main" Requires="p14">
+      <mc:AlternateContent xmlns:mc="http://schemas.openxmlformats.org/markup-compatibility/2006" xmlns:p14="http://schemas.microsoft.com/office/powerpoint/2010/main">
+        <mc:Choice Requires="p14">
           <p:contentPart p14:bwMode="auto" r:id="rId23">
             <p14:nvContentPartPr>
               <p14:cNvPr id="20" name="Ink 19">
@@ -13360,7 +13366,7 @@
             </p14:xfrm>
           </p:contentPart>
         </mc:Choice>
-        <mc:Fallback>
+        <mc:Fallback xmlns="">
           <p:pic>
             <p:nvPicPr>
               <p:cNvPr id="20" name="Ink 19">
@@ -13391,8 +13397,8 @@
           </p:pic>
         </mc:Fallback>
       </mc:AlternateContent>
-      <mc:AlternateContent xmlns:mc="http://schemas.openxmlformats.org/markup-compatibility/2006">
-        <mc:Choice xmlns:p14="http://schemas.microsoft.com/office/powerpoint/2010/main" Requires="p14">
+      <mc:AlternateContent xmlns:mc="http://schemas.openxmlformats.org/markup-compatibility/2006" xmlns:p14="http://schemas.microsoft.com/office/powerpoint/2010/main">
+        <mc:Choice Requires="p14">
           <p:contentPart p14:bwMode="auto" r:id="rId25">
             <p14:nvContentPartPr>
               <p14:cNvPr id="21" name="Ink 20">
@@ -13411,7 +13417,7 @@
             </p14:xfrm>
           </p:contentPart>
         </mc:Choice>
-        <mc:Fallback>
+        <mc:Fallback xmlns="">
           <p:pic>
             <p:nvPicPr>
               <p:cNvPr id="21" name="Ink 20">
@@ -13442,8 +13448,8 @@
           </p:pic>
         </mc:Fallback>
       </mc:AlternateContent>
-      <mc:AlternateContent xmlns:mc="http://schemas.openxmlformats.org/markup-compatibility/2006">
-        <mc:Choice xmlns:p14="http://schemas.microsoft.com/office/powerpoint/2010/main" Requires="p14">
+      <mc:AlternateContent xmlns:mc="http://schemas.openxmlformats.org/markup-compatibility/2006" xmlns:p14="http://schemas.microsoft.com/office/powerpoint/2010/main">
+        <mc:Choice Requires="p14">
           <p:contentPart p14:bwMode="auto" r:id="rId27">
             <p14:nvContentPartPr>
               <p14:cNvPr id="22" name="Ink 21">
@@ -13462,7 +13468,7 @@
             </p14:xfrm>
           </p:contentPart>
         </mc:Choice>
-        <mc:Fallback>
+        <mc:Fallback xmlns="">
           <p:pic>
             <p:nvPicPr>
               <p:cNvPr id="22" name="Ink 21">
@@ -13493,8 +13499,8 @@
           </p:pic>
         </mc:Fallback>
       </mc:AlternateContent>
-      <mc:AlternateContent xmlns:mc="http://schemas.openxmlformats.org/markup-compatibility/2006">
-        <mc:Choice xmlns:p14="http://schemas.microsoft.com/office/powerpoint/2010/main" Requires="p14">
+      <mc:AlternateContent xmlns:mc="http://schemas.openxmlformats.org/markup-compatibility/2006" xmlns:p14="http://schemas.microsoft.com/office/powerpoint/2010/main">
+        <mc:Choice Requires="p14">
           <p:contentPart p14:bwMode="auto" r:id="rId29">
             <p14:nvContentPartPr>
               <p14:cNvPr id="25" name="Ink 24">
@@ -13513,7 +13519,7 @@
             </p14:xfrm>
           </p:contentPart>
         </mc:Choice>
-        <mc:Fallback>
+        <mc:Fallback xmlns="">
           <p:pic>
             <p:nvPicPr>
               <p:cNvPr id="25" name="Ink 24">
@@ -13544,8 +13550,8 @@
           </p:pic>
         </mc:Fallback>
       </mc:AlternateContent>
-      <mc:AlternateContent xmlns:mc="http://schemas.openxmlformats.org/markup-compatibility/2006">
-        <mc:Choice xmlns:p14="http://schemas.microsoft.com/office/powerpoint/2010/main" Requires="p14">
+      <mc:AlternateContent xmlns:mc="http://schemas.openxmlformats.org/markup-compatibility/2006" xmlns:p14="http://schemas.microsoft.com/office/powerpoint/2010/main">
+        <mc:Choice Requires="p14">
           <p:contentPart p14:bwMode="auto" r:id="rId31">
             <p14:nvContentPartPr>
               <p14:cNvPr id="26" name="Ink 25">
@@ -13564,7 +13570,7 @@
             </p14:xfrm>
           </p:contentPart>
         </mc:Choice>
-        <mc:Fallback>
+        <mc:Fallback xmlns="">
           <p:pic>
             <p:nvPicPr>
               <p:cNvPr id="26" name="Ink 25">
@@ -13595,8 +13601,8 @@
           </p:pic>
         </mc:Fallback>
       </mc:AlternateContent>
-      <mc:AlternateContent xmlns:mc="http://schemas.openxmlformats.org/markup-compatibility/2006">
-        <mc:Choice xmlns:p14="http://schemas.microsoft.com/office/powerpoint/2010/main" Requires="p14">
+      <mc:AlternateContent xmlns:mc="http://schemas.openxmlformats.org/markup-compatibility/2006" xmlns:p14="http://schemas.microsoft.com/office/powerpoint/2010/main">
+        <mc:Choice Requires="p14">
           <p:contentPart p14:bwMode="auto" r:id="rId33">
             <p14:nvContentPartPr>
               <p14:cNvPr id="27" name="Ink 26">
@@ -13615,7 +13621,7 @@
             </p14:xfrm>
           </p:contentPart>
         </mc:Choice>
-        <mc:Fallback>
+        <mc:Fallback xmlns="">
           <p:pic>
             <p:nvPicPr>
               <p:cNvPr id="27" name="Ink 26">
@@ -13646,8 +13652,8 @@
           </p:pic>
         </mc:Fallback>
       </mc:AlternateContent>
-      <mc:AlternateContent xmlns:mc="http://schemas.openxmlformats.org/markup-compatibility/2006">
-        <mc:Choice xmlns:p14="http://schemas.microsoft.com/office/powerpoint/2010/main" Requires="p14">
+      <mc:AlternateContent xmlns:mc="http://schemas.openxmlformats.org/markup-compatibility/2006" xmlns:p14="http://schemas.microsoft.com/office/powerpoint/2010/main">
+        <mc:Choice Requires="p14">
           <p:contentPart p14:bwMode="auto" r:id="rId35">
             <p14:nvContentPartPr>
               <p14:cNvPr id="28" name="Ink 27">
@@ -13666,7 +13672,7 @@
             </p14:xfrm>
           </p:contentPart>
         </mc:Choice>
-        <mc:Fallback>
+        <mc:Fallback xmlns="">
           <p:pic>
             <p:nvPicPr>
               <p:cNvPr id="28" name="Ink 27">

</xml_diff>